<commit_message>
+ Compile_FAST.bat should now work with latest changes to code. + updated source/dependencies with code using updated FAST Registry.
git-svn-id: https://windsvn2.nrel.gov/FAST/branches/BJonkman@601 10acb478-4768-415a-8850-bacdb5912d4d

Former-commit-id: 46bd1474ced135d939fbfb3f6c1903ea32ca6932
</commit_message>
<xml_diff>
--- a/Docs/InputOutputFiles.pptx
+++ b/Docs/InputOutputFiles.pptx
@@ -10,6 +10,9 @@
     <p:sldId id="258" r:id="rId4"/>
     <p:sldId id="260" r:id="rId5"/>
     <p:sldId id="261" r:id="rId6"/>
+    <p:sldId id="262" r:id="rId7"/>
+    <p:sldId id="263" r:id="rId8"/>
+    <p:sldId id="264" r:id="rId9"/>
   </p:sldIdLst>
   <p:sldSz cx="9144000" cy="6858000" type="screen4x3"/>
   <p:notesSz cx="6858000" cy="9144000"/>
@@ -125,6 +128,9 @@
           <p14:sldIdLst>
             <p14:sldId id="260"/>
             <p14:sldId id="261"/>
+            <p14:sldId id="262"/>
+            <p14:sldId id="263"/>
+            <p14:sldId id="264"/>
           </p14:sldIdLst>
         </p14:section>
       </p14:sectionLst>
@@ -31345,6 +31351,2251 @@
   <p:transition>
     <p:fade/>
   </p:transition>
+</p:sld>
+</file>
+
+<file path=ppt/slides/slide5.xml><?xml version="1.0" encoding="utf-8"?>
+<p:sld xmlns:a="http://schemas.openxmlformats.org/drawingml/2006/main" xmlns:r="http://schemas.openxmlformats.org/officeDocument/2006/relationships" xmlns:p="http://schemas.openxmlformats.org/presentationml/2006/main">
+  <p:cSld>
+    <p:spTree>
+      <p:nvGrpSpPr>
+        <p:cNvPr id="1" name=""/>
+        <p:cNvGrpSpPr/>
+        <p:nvPr/>
+      </p:nvGrpSpPr>
+      <p:grpSpPr>
+        <a:xfrm>
+          <a:off x="0" y="0"/>
+          <a:ext cx="0" cy="0"/>
+          <a:chOff x="0" y="0"/>
+          <a:chExt cx="0" cy="0"/>
+        </a:xfrm>
+      </p:grpSpPr>
+      <p:sp>
+        <p:nvSpPr>
+          <p:cNvPr id="2" name="Title 1"/>
+          <p:cNvSpPr>
+            <a:spLocks noGrp="1"/>
+          </p:cNvSpPr>
+          <p:nvPr>
+            <p:ph type="title"/>
+          </p:nvPr>
+        </p:nvSpPr>
+        <p:spPr/>
+        <p:txBody>
+          <a:bodyPr/>
+          <a:lstStyle/>
+          <a:p>
+            <a:endParaRPr lang="en-US"/>
+          </a:p>
+        </p:txBody>
+      </p:sp>
+      <p:sp>
+        <p:nvSpPr>
+          <p:cNvPr id="3" name="Content Placeholder 2"/>
+          <p:cNvSpPr>
+            <a:spLocks noGrp="1"/>
+          </p:cNvSpPr>
+          <p:nvPr>
+            <p:ph idx="1"/>
+          </p:nvPr>
+        </p:nvSpPr>
+        <p:spPr/>
+        <p:txBody>
+          <a:bodyPr/>
+          <a:lstStyle/>
+          <a:p>
+            <a:endParaRPr lang="en-US"/>
+          </a:p>
+        </p:txBody>
+      </p:sp>
+    </p:spTree>
+    <p:extLst>
+      <p:ext uri="{BB962C8B-B14F-4D97-AF65-F5344CB8AC3E}">
+        <p14:creationId xmlns:p14="http://schemas.microsoft.com/office/powerpoint/2010/main" val="379930013"/>
+      </p:ext>
+    </p:extLst>
+  </p:cSld>
+  <p:clrMapOvr>
+    <a:masterClrMapping/>
+  </p:clrMapOvr>
+  <p:transition>
+    <p:fade/>
+  </p:transition>
+</p:sld>
+</file>
+
+<file path=ppt/slides/slide6.xml><?xml version="1.0" encoding="utf-8"?>
+<p:sld xmlns:a="http://schemas.openxmlformats.org/drawingml/2006/main" xmlns:r="http://schemas.openxmlformats.org/officeDocument/2006/relationships" xmlns:p="http://schemas.openxmlformats.org/presentationml/2006/main">
+  <p:cSld>
+    <p:spTree>
+      <p:nvGrpSpPr>
+        <p:cNvPr id="1" name=""/>
+        <p:cNvGrpSpPr/>
+        <p:nvPr/>
+      </p:nvGrpSpPr>
+      <p:grpSpPr>
+        <a:xfrm>
+          <a:off x="0" y="0"/>
+          <a:ext cx="0" cy="0"/>
+          <a:chOff x="0" y="0"/>
+          <a:chExt cx="0" cy="0"/>
+        </a:xfrm>
+      </p:grpSpPr>
+      <p:sp>
+        <p:nvSpPr>
+          <p:cNvPr id="4" name="Rectangle 13"/>
+          <p:cNvSpPr>
+            <a:spLocks noChangeArrowheads="1"/>
+          </p:cNvSpPr>
+          <p:nvPr/>
+        </p:nvSpPr>
+        <p:spPr bwMode="auto">
+          <a:xfrm>
+            <a:off x="6502400" y="3109748"/>
+            <a:ext cx="1096963" cy="1767047"/>
+          </a:xfrm>
+          <a:prstGeom prst="rect">
+            <a:avLst/>
+          </a:prstGeom>
+          <a:solidFill>
+            <a:srgbClr val="FFFFCC"/>
+          </a:solidFill>
+          <a:ln w="63500" cmpd="sng" algn="ctr">
+            <a:solidFill>
+              <a:schemeClr val="tx1"/>
+            </a:solidFill>
+            <a:prstDash val="solid"/>
+            <a:miter lim="800000"/>
+            <a:headEnd/>
+            <a:tailEnd/>
+          </a:ln>
+        </p:spPr>
+        <p:txBody>
+          <a:bodyPr wrap="none" anchor="b" anchorCtr="1"/>
+          <a:lstStyle/>
+          <a:p>
+            <a:pPr algn="ctr"/>
+            <a:r>
+              <a:rPr lang="en-US" sz="1400" b="1" dirty="0" err="1">
+                <a:solidFill>
+                  <a:srgbClr val="0959A5"/>
+                </a:solidFill>
+              </a:rPr>
+              <a:t>SubDyn</a:t>
+            </a:r>
+            <a:r>
+              <a:rPr lang="en-US" sz="1100" dirty="0">
+                <a:solidFill>
+                  <a:srgbClr val="0959A5"/>
+                </a:solidFill>
+              </a:rPr>
+              <a:t/>
+            </a:r>
+            <a:br>
+              <a:rPr lang="en-US" sz="1100" dirty="0">
+                <a:solidFill>
+                  <a:srgbClr val="0959A5"/>
+                </a:solidFill>
+              </a:rPr>
+            </a:br>
+            <a:r>
+              <a:rPr lang="en-US" sz="1100" dirty="0">
+                <a:solidFill>
+                  <a:srgbClr val="0959A5"/>
+                </a:solidFill>
+              </a:rPr>
+              <a:t>Multi-Member</a:t>
+            </a:r>
+          </a:p>
+          <a:p>
+            <a:pPr algn="ctr"/>
+            <a:r>
+              <a:rPr lang="en-US" sz="1100" dirty="0" err="1">
+                <a:solidFill>
+                  <a:srgbClr val="0959A5"/>
+                </a:solidFill>
+              </a:rPr>
+              <a:t>Substruct</a:t>
+            </a:r>
+            <a:r>
+              <a:rPr lang="en-US" sz="1100" dirty="0">
+                <a:solidFill>
+                  <a:srgbClr val="0959A5"/>
+                </a:solidFill>
+              </a:rPr>
+              <a:t>. </a:t>
+            </a:r>
+            <a:r>
+              <a:rPr lang="en-US" sz="1100" dirty="0" err="1">
+                <a:solidFill>
+                  <a:srgbClr val="0959A5"/>
+                </a:solidFill>
+              </a:rPr>
+              <a:t>Dyn</a:t>
+            </a:r>
+            <a:r>
+              <a:rPr lang="en-US" sz="1100" dirty="0">
+                <a:solidFill>
+                  <a:srgbClr val="0959A5"/>
+                </a:solidFill>
+              </a:rPr>
+              <a:t>.</a:t>
+            </a:r>
+          </a:p>
+        </p:txBody>
+      </p:sp>
+      <p:sp>
+        <p:nvSpPr>
+          <p:cNvPr id="5" name="Rectangle 14"/>
+          <p:cNvSpPr>
+            <a:spLocks noChangeArrowheads="1"/>
+          </p:cNvSpPr>
+          <p:nvPr/>
+        </p:nvSpPr>
+        <p:spPr bwMode="auto">
+          <a:xfrm>
+            <a:off x="3886200" y="3109748"/>
+            <a:ext cx="1214851" cy="1767047"/>
+          </a:xfrm>
+          <a:prstGeom prst="rect">
+            <a:avLst/>
+          </a:prstGeom>
+          <a:solidFill>
+            <a:srgbClr val="FFFFCC"/>
+          </a:solidFill>
+          <a:ln w="63500" algn="ctr">
+            <a:solidFill>
+              <a:schemeClr val="tx1"/>
+            </a:solidFill>
+            <a:miter lim="800000"/>
+            <a:headEnd/>
+            <a:tailEnd/>
+          </a:ln>
+        </p:spPr>
+        <p:txBody>
+          <a:bodyPr wrap="none" anchor="b" anchorCtr="1"/>
+          <a:lstStyle/>
+          <a:p>
+            <a:pPr algn="ctr"/>
+            <a:r>
+              <a:rPr lang="en-US" sz="1400" b="1" dirty="0" err="1">
+                <a:solidFill>
+                  <a:srgbClr val="0959A5"/>
+                </a:solidFill>
+              </a:rPr>
+              <a:t>ElastoDyn</a:t>
+            </a:r>
+            <a:endParaRPr lang="en-US" sz="1400" b="1" dirty="0">
+              <a:solidFill>
+                <a:srgbClr val="0959A5"/>
+              </a:solidFill>
+            </a:endParaRPr>
+          </a:p>
+          <a:p>
+            <a:pPr algn="ctr"/>
+            <a:r>
+              <a:rPr lang="en-US" sz="1100" dirty="0">
+                <a:solidFill>
+                  <a:srgbClr val="0959A5"/>
+                </a:solidFill>
+              </a:rPr>
+              <a:t>Structural</a:t>
+            </a:r>
+            <a:br>
+              <a:rPr lang="en-US" sz="1100" dirty="0">
+                <a:solidFill>
+                  <a:srgbClr val="0959A5"/>
+                </a:solidFill>
+              </a:rPr>
+            </a:br>
+            <a:r>
+              <a:rPr lang="en-US" sz="1100" dirty="0">
+                <a:solidFill>
+                  <a:srgbClr val="0959A5"/>
+                </a:solidFill>
+              </a:rPr>
+              <a:t>Dynamics</a:t>
+            </a:r>
+          </a:p>
+        </p:txBody>
+      </p:sp>
+      <p:sp>
+        <p:nvSpPr>
+          <p:cNvPr id="6" name="Rectangle 20"/>
+          <p:cNvSpPr>
+            <a:spLocks noChangeArrowheads="1"/>
+          </p:cNvSpPr>
+          <p:nvPr/>
+        </p:nvSpPr>
+        <p:spPr bwMode="auto">
+          <a:xfrm>
+            <a:off x="7772400" y="3109748"/>
+            <a:ext cx="1096963" cy="1767047"/>
+          </a:xfrm>
+          <a:prstGeom prst="rect">
+            <a:avLst/>
+          </a:prstGeom>
+          <a:solidFill>
+            <a:srgbClr val="FFFFCC"/>
+          </a:solidFill>
+          <a:ln w="63500" algn="ctr">
+            <a:solidFill>
+              <a:schemeClr val="tx1"/>
+            </a:solidFill>
+            <a:prstDash val="solid"/>
+            <a:miter lim="800000"/>
+            <a:headEnd/>
+            <a:tailEnd/>
+          </a:ln>
+        </p:spPr>
+        <p:txBody>
+          <a:bodyPr wrap="none" anchor="b" anchorCtr="1"/>
+          <a:lstStyle/>
+          <a:p>
+            <a:pPr algn="ctr"/>
+            <a:r>
+              <a:rPr lang="en-US" sz="1400" b="1" dirty="0">
+                <a:solidFill>
+                  <a:srgbClr val="0959A5"/>
+                </a:solidFill>
+              </a:rPr>
+              <a:t>MAP</a:t>
+            </a:r>
+          </a:p>
+          <a:p>
+            <a:pPr algn="ctr"/>
+            <a:r>
+              <a:rPr lang="en-US" sz="1100" dirty="0">
+                <a:solidFill>
+                  <a:srgbClr val="0959A5"/>
+                </a:solidFill>
+              </a:rPr>
+              <a:t>Mooring Statics</a:t>
+            </a:r>
+          </a:p>
+          <a:p>
+            <a:pPr algn="ctr"/>
+            <a:r>
+              <a:rPr lang="en-US" sz="1100" dirty="0">
+                <a:solidFill>
+                  <a:srgbClr val="0959A5"/>
+                </a:solidFill>
+              </a:rPr>
+              <a:t>&amp; Dynamics</a:t>
+            </a:r>
+          </a:p>
+        </p:txBody>
+      </p:sp>
+      <p:sp>
+        <p:nvSpPr>
+          <p:cNvPr id="9" name="Rectangle 45"/>
+          <p:cNvSpPr>
+            <a:spLocks noChangeArrowheads="1"/>
+          </p:cNvSpPr>
+          <p:nvPr/>
+        </p:nvSpPr>
+        <p:spPr bwMode="auto">
+          <a:xfrm>
+            <a:off x="5232400" y="3109748"/>
+            <a:ext cx="1096963" cy="1767047"/>
+          </a:xfrm>
+          <a:prstGeom prst="rect">
+            <a:avLst/>
+          </a:prstGeom>
+          <a:solidFill>
+            <a:srgbClr val="FFFFCC"/>
+          </a:solidFill>
+          <a:ln w="63500" algn="ctr">
+            <a:solidFill>
+              <a:schemeClr val="tx1"/>
+            </a:solidFill>
+            <a:prstDash val="sysDash"/>
+            <a:miter lim="800000"/>
+            <a:headEnd/>
+            <a:tailEnd/>
+          </a:ln>
+        </p:spPr>
+        <p:txBody>
+          <a:bodyPr wrap="none" anchor="b" anchorCtr="1"/>
+          <a:lstStyle/>
+          <a:p>
+            <a:pPr algn="ctr"/>
+            <a:r>
+              <a:rPr lang="en-US" sz="1400" b="1" dirty="0" err="1">
+                <a:solidFill>
+                  <a:srgbClr val="0959A5"/>
+                </a:solidFill>
+              </a:rPr>
+              <a:t>BeamDyn</a:t>
+            </a:r>
+            <a:endParaRPr lang="en-US" sz="1400" b="1" dirty="0">
+              <a:solidFill>
+                <a:srgbClr val="0959A5"/>
+              </a:solidFill>
+            </a:endParaRPr>
+          </a:p>
+          <a:p>
+            <a:pPr algn="ctr"/>
+            <a:r>
+              <a:rPr lang="en-US" sz="1100" dirty="0">
+                <a:solidFill>
+                  <a:srgbClr val="0959A5"/>
+                </a:solidFill>
+              </a:rPr>
+              <a:t>Nonlinear FE</a:t>
+            </a:r>
+          </a:p>
+          <a:p>
+            <a:pPr algn="ctr"/>
+            <a:r>
+              <a:rPr lang="en-US" sz="1100" dirty="0">
+                <a:solidFill>
+                  <a:srgbClr val="0959A5"/>
+                </a:solidFill>
+              </a:rPr>
+              <a:t>Blade Dynamics</a:t>
+            </a:r>
+          </a:p>
+        </p:txBody>
+      </p:sp>
+      <p:sp>
+        <p:nvSpPr>
+          <p:cNvPr id="10" name="Rectangle 16"/>
+          <p:cNvSpPr>
+            <a:spLocks noChangeArrowheads="1"/>
+          </p:cNvSpPr>
+          <p:nvPr/>
+        </p:nvSpPr>
+        <p:spPr bwMode="auto">
+          <a:xfrm>
+            <a:off x="2692400" y="3109748"/>
+            <a:ext cx="1096963" cy="1767048"/>
+          </a:xfrm>
+          <a:prstGeom prst="rect">
+            <a:avLst/>
+          </a:prstGeom>
+          <a:solidFill>
+            <a:srgbClr val="FFFFCC"/>
+          </a:solidFill>
+          <a:ln w="63500" algn="ctr">
+            <a:solidFill>
+              <a:schemeClr val="tx1"/>
+            </a:solidFill>
+            <a:miter lim="800000"/>
+            <a:headEnd/>
+            <a:tailEnd/>
+          </a:ln>
+        </p:spPr>
+        <p:txBody>
+          <a:bodyPr wrap="none" anchor="b" anchorCtr="1"/>
+          <a:lstStyle/>
+          <a:p>
+            <a:pPr algn="ctr"/>
+            <a:r>
+              <a:rPr lang="en-US" sz="1400" b="1" dirty="0" err="1">
+                <a:solidFill>
+                  <a:srgbClr val="0959A5"/>
+                </a:solidFill>
+              </a:rPr>
+              <a:t>ServoDyn</a:t>
+            </a:r>
+            <a:endParaRPr lang="en-US" sz="1400" b="1" dirty="0">
+              <a:solidFill>
+                <a:srgbClr val="0959A5"/>
+              </a:solidFill>
+            </a:endParaRPr>
+          </a:p>
+          <a:p>
+            <a:pPr algn="ctr"/>
+            <a:r>
+              <a:rPr lang="en-US" sz="1100" dirty="0">
+                <a:solidFill>
+                  <a:srgbClr val="0959A5"/>
+                </a:solidFill>
+              </a:rPr>
+              <a:t>Control &amp;</a:t>
+            </a:r>
+            <a:br>
+              <a:rPr lang="en-US" sz="1100" dirty="0">
+                <a:solidFill>
+                  <a:srgbClr val="0959A5"/>
+                </a:solidFill>
+              </a:rPr>
+            </a:br>
+            <a:r>
+              <a:rPr lang="en-US" sz="1100" dirty="0">
+                <a:solidFill>
+                  <a:srgbClr val="0959A5"/>
+                </a:solidFill>
+              </a:rPr>
+              <a:t>Electrical Drive</a:t>
+            </a:r>
+          </a:p>
+        </p:txBody>
+      </p:sp>
+      <p:sp>
+        <p:nvSpPr>
+          <p:cNvPr id="11" name="Rectangle 16"/>
+          <p:cNvSpPr>
+            <a:spLocks noChangeArrowheads="1"/>
+          </p:cNvSpPr>
+          <p:nvPr/>
+        </p:nvSpPr>
+        <p:spPr bwMode="auto">
+          <a:xfrm rot="5400000">
+            <a:off x="3825079" y="1432717"/>
+            <a:ext cx="1371603" cy="8716962"/>
+          </a:xfrm>
+          <a:prstGeom prst="rect">
+            <a:avLst/>
+          </a:prstGeom>
+          <a:solidFill>
+            <a:srgbClr val="FFFFCC"/>
+          </a:solidFill>
+          <a:ln w="63500" algn="ctr">
+            <a:solidFill>
+              <a:schemeClr val="tx1"/>
+            </a:solidFill>
+            <a:miter lim="800000"/>
+            <a:headEnd/>
+            <a:tailEnd/>
+          </a:ln>
+        </p:spPr>
+        <p:txBody>
+          <a:bodyPr vert="vert270" wrap="none" anchor="b" anchorCtr="1"/>
+          <a:lstStyle/>
+          <a:p>
+            <a:pPr algn="ctr"/>
+            <a:r>
+              <a:rPr lang="en-US" sz="1800" b="1" dirty="0">
+                <a:solidFill>
+                  <a:srgbClr val="0959A5"/>
+                </a:solidFill>
+              </a:rPr>
+              <a:t>FAST</a:t>
+            </a:r>
+          </a:p>
+          <a:p>
+            <a:pPr algn="ctr"/>
+            <a:r>
+              <a:rPr lang="en-US" sz="1200" dirty="0">
+                <a:solidFill>
+                  <a:srgbClr val="0959A5"/>
+                </a:solidFill>
+              </a:rPr>
+              <a:t>Driver</a:t>
+            </a:r>
+            <a:endParaRPr lang="en-US" sz="1400" dirty="0">
+              <a:solidFill>
+                <a:srgbClr val="0959A5"/>
+              </a:solidFill>
+            </a:endParaRPr>
+          </a:p>
+        </p:txBody>
+      </p:sp>
+      <p:sp>
+        <p:nvSpPr>
+          <p:cNvPr id="12" name="Rectangle 15"/>
+          <p:cNvSpPr>
+            <a:spLocks noChangeArrowheads="1"/>
+          </p:cNvSpPr>
+          <p:nvPr/>
+        </p:nvSpPr>
+        <p:spPr bwMode="auto">
+          <a:xfrm>
+            <a:off x="152400" y="3109748"/>
+            <a:ext cx="1096963" cy="1767047"/>
+          </a:xfrm>
+          <a:prstGeom prst="rect">
+            <a:avLst/>
+          </a:prstGeom>
+          <a:solidFill>
+            <a:srgbClr val="FFFFCC"/>
+          </a:solidFill>
+          <a:ln w="63500" algn="ctr">
+            <a:solidFill>
+              <a:schemeClr val="tx1"/>
+            </a:solidFill>
+            <a:miter lim="800000"/>
+            <a:headEnd/>
+            <a:tailEnd/>
+          </a:ln>
+        </p:spPr>
+        <p:txBody>
+          <a:bodyPr wrap="none" anchor="b" anchorCtr="1"/>
+          <a:lstStyle/>
+          <a:p>
+            <a:pPr algn="ctr"/>
+            <a:r>
+              <a:rPr lang="en-US" sz="1400" b="1" dirty="0">
+                <a:solidFill>
+                  <a:srgbClr val="0959A5"/>
+                </a:solidFill>
+              </a:rPr>
+              <a:t>AeroDyn</a:t>
+            </a:r>
+          </a:p>
+          <a:p>
+            <a:pPr algn="ctr"/>
+            <a:r>
+              <a:rPr lang="en-US" sz="1100" dirty="0" smtClean="0">
+                <a:solidFill>
+                  <a:srgbClr val="0959A5"/>
+                </a:solidFill>
+              </a:rPr>
+              <a:t>Aerodynamics</a:t>
+            </a:r>
+            <a:br>
+              <a:rPr lang="en-US" sz="1100" dirty="0" smtClean="0">
+                <a:solidFill>
+                  <a:srgbClr val="0959A5"/>
+                </a:solidFill>
+              </a:rPr>
+            </a:br>
+            <a:endParaRPr lang="en-US" sz="1100" dirty="0">
+              <a:solidFill>
+                <a:srgbClr val="0959A5"/>
+              </a:solidFill>
+            </a:endParaRPr>
+          </a:p>
+        </p:txBody>
+      </p:sp>
+      <p:sp>
+        <p:nvSpPr>
+          <p:cNvPr id="13" name="Rectangle 42"/>
+          <p:cNvSpPr>
+            <a:spLocks noChangeArrowheads="1"/>
+          </p:cNvSpPr>
+          <p:nvPr/>
+        </p:nvSpPr>
+        <p:spPr bwMode="auto">
+          <a:xfrm>
+            <a:off x="1371600" y="3109748"/>
+            <a:ext cx="1219200" cy="1767047"/>
+          </a:xfrm>
+          <a:prstGeom prst="rect">
+            <a:avLst/>
+          </a:prstGeom>
+          <a:solidFill>
+            <a:srgbClr val="FFFFCC"/>
+          </a:solidFill>
+          <a:ln w="63500" cmpd="sng" algn="ctr">
+            <a:solidFill>
+              <a:schemeClr val="tx1"/>
+            </a:solidFill>
+            <a:prstDash val="solid"/>
+            <a:miter lim="800000"/>
+            <a:headEnd/>
+            <a:tailEnd/>
+          </a:ln>
+        </p:spPr>
+        <p:txBody>
+          <a:bodyPr wrap="none" anchor="b" anchorCtr="1"/>
+          <a:lstStyle/>
+          <a:p>
+            <a:pPr algn="ctr"/>
+            <a:r>
+              <a:rPr lang="en-US" sz="1400" b="1" dirty="0" err="1">
+                <a:solidFill>
+                  <a:srgbClr val="0959A5"/>
+                </a:solidFill>
+              </a:rPr>
+              <a:t>HydroDyn</a:t>
+            </a:r>
+            <a:endParaRPr lang="en-US" sz="1400" b="1" dirty="0">
+              <a:solidFill>
+                <a:srgbClr val="0959A5"/>
+              </a:solidFill>
+            </a:endParaRPr>
+          </a:p>
+          <a:p>
+            <a:pPr algn="ctr"/>
+            <a:r>
+              <a:rPr lang="en-US" sz="1100" dirty="0" smtClean="0">
+                <a:solidFill>
+                  <a:srgbClr val="0959A5"/>
+                </a:solidFill>
+              </a:rPr>
+              <a:t>Hydrodynamics</a:t>
+            </a:r>
+            <a:br>
+              <a:rPr lang="en-US" sz="1100" dirty="0" smtClean="0">
+                <a:solidFill>
+                  <a:srgbClr val="0959A5"/>
+                </a:solidFill>
+              </a:rPr>
+            </a:br>
+            <a:endParaRPr lang="en-US" sz="1100" dirty="0">
+              <a:solidFill>
+                <a:srgbClr val="0959A5"/>
+              </a:solidFill>
+            </a:endParaRPr>
+          </a:p>
+        </p:txBody>
+      </p:sp>
+      <p:cxnSp>
+        <p:nvCxnSpPr>
+          <p:cNvPr id="26" name="Straight Arrow Connector 25"/>
+          <p:cNvCxnSpPr/>
+          <p:nvPr/>
+        </p:nvCxnSpPr>
+        <p:spPr>
+          <a:xfrm flipH="1">
+            <a:off x="700880" y="4870980"/>
+            <a:ext cx="1" cy="228600"/>
+          </a:xfrm>
+          <a:prstGeom prst="straightConnector1">
+            <a:avLst/>
+          </a:prstGeom>
+          <a:ln w="15875">
+            <a:solidFill>
+              <a:schemeClr val="tx2"/>
+            </a:solidFill>
+            <a:tailEnd type="arrow"/>
+          </a:ln>
+        </p:spPr>
+        <p:style>
+          <a:lnRef idx="1">
+            <a:schemeClr val="accent1"/>
+          </a:lnRef>
+          <a:fillRef idx="0">
+            <a:schemeClr val="accent1"/>
+          </a:fillRef>
+          <a:effectRef idx="0">
+            <a:schemeClr val="accent1"/>
+          </a:effectRef>
+          <a:fontRef idx="minor">
+            <a:schemeClr val="tx1"/>
+          </a:fontRef>
+        </p:style>
+      </p:cxnSp>
+      <p:cxnSp>
+        <p:nvCxnSpPr>
+          <p:cNvPr id="29" name="Straight Arrow Connector 28"/>
+          <p:cNvCxnSpPr/>
+          <p:nvPr/>
+        </p:nvCxnSpPr>
+        <p:spPr>
+          <a:xfrm flipH="1">
+            <a:off x="1945733" y="4870980"/>
+            <a:ext cx="1814" cy="228600"/>
+          </a:xfrm>
+          <a:prstGeom prst="straightConnector1">
+            <a:avLst/>
+          </a:prstGeom>
+          <a:ln w="15875">
+            <a:solidFill>
+              <a:schemeClr val="tx2"/>
+            </a:solidFill>
+            <a:tailEnd type="arrow"/>
+          </a:ln>
+        </p:spPr>
+        <p:style>
+          <a:lnRef idx="1">
+            <a:schemeClr val="accent1"/>
+          </a:lnRef>
+          <a:fillRef idx="0">
+            <a:schemeClr val="accent1"/>
+          </a:fillRef>
+          <a:effectRef idx="0">
+            <a:schemeClr val="accent1"/>
+          </a:effectRef>
+          <a:fontRef idx="minor">
+            <a:schemeClr val="tx1"/>
+          </a:fontRef>
+        </p:style>
+      </p:cxnSp>
+      <p:cxnSp>
+        <p:nvCxnSpPr>
+          <p:cNvPr id="30" name="Straight Arrow Connector 29"/>
+          <p:cNvCxnSpPr/>
+          <p:nvPr/>
+        </p:nvCxnSpPr>
+        <p:spPr>
+          <a:xfrm>
+            <a:off x="3240881" y="4860900"/>
+            <a:ext cx="0" cy="228600"/>
+          </a:xfrm>
+          <a:prstGeom prst="straightConnector1">
+            <a:avLst/>
+          </a:prstGeom>
+          <a:ln w="15875">
+            <a:solidFill>
+              <a:schemeClr val="tx2"/>
+            </a:solidFill>
+            <a:tailEnd type="arrow"/>
+          </a:ln>
+        </p:spPr>
+        <p:style>
+          <a:lnRef idx="1">
+            <a:schemeClr val="accent1"/>
+          </a:lnRef>
+          <a:fillRef idx="0">
+            <a:schemeClr val="accent1"/>
+          </a:fillRef>
+          <a:effectRef idx="0">
+            <a:schemeClr val="accent1"/>
+          </a:effectRef>
+          <a:fontRef idx="minor">
+            <a:schemeClr val="tx1"/>
+          </a:fontRef>
+        </p:style>
+      </p:cxnSp>
+      <p:cxnSp>
+        <p:nvCxnSpPr>
+          <p:cNvPr id="31" name="Straight Arrow Connector 30"/>
+          <p:cNvCxnSpPr/>
+          <p:nvPr/>
+        </p:nvCxnSpPr>
+        <p:spPr>
+          <a:xfrm>
+            <a:off x="4502661" y="4870980"/>
+            <a:ext cx="0" cy="228600"/>
+          </a:xfrm>
+          <a:prstGeom prst="straightConnector1">
+            <a:avLst/>
+          </a:prstGeom>
+          <a:ln w="15875">
+            <a:solidFill>
+              <a:schemeClr val="tx2"/>
+            </a:solidFill>
+            <a:tailEnd type="arrow"/>
+          </a:ln>
+        </p:spPr>
+        <p:style>
+          <a:lnRef idx="1">
+            <a:schemeClr val="accent1"/>
+          </a:lnRef>
+          <a:fillRef idx="0">
+            <a:schemeClr val="accent1"/>
+          </a:fillRef>
+          <a:effectRef idx="0">
+            <a:schemeClr val="accent1"/>
+          </a:effectRef>
+          <a:fontRef idx="minor">
+            <a:schemeClr val="tx1"/>
+          </a:fontRef>
+        </p:style>
+      </p:cxnSp>
+      <p:cxnSp>
+        <p:nvCxnSpPr>
+          <p:cNvPr id="32" name="Straight Arrow Connector 31"/>
+          <p:cNvCxnSpPr/>
+          <p:nvPr/>
+        </p:nvCxnSpPr>
+        <p:spPr>
+          <a:xfrm>
+            <a:off x="5780881" y="4870980"/>
+            <a:ext cx="0" cy="228600"/>
+          </a:xfrm>
+          <a:prstGeom prst="straightConnector1">
+            <a:avLst/>
+          </a:prstGeom>
+          <a:ln w="15875">
+            <a:solidFill>
+              <a:schemeClr val="tx2"/>
+            </a:solidFill>
+            <a:prstDash val="dash"/>
+            <a:tailEnd type="arrow"/>
+          </a:ln>
+        </p:spPr>
+        <p:style>
+          <a:lnRef idx="1">
+            <a:schemeClr val="accent1"/>
+          </a:lnRef>
+          <a:fillRef idx="0">
+            <a:schemeClr val="accent1"/>
+          </a:fillRef>
+          <a:effectRef idx="0">
+            <a:schemeClr val="accent1"/>
+          </a:effectRef>
+          <a:fontRef idx="minor">
+            <a:schemeClr val="tx1"/>
+          </a:fontRef>
+        </p:style>
+      </p:cxnSp>
+      <p:cxnSp>
+        <p:nvCxnSpPr>
+          <p:cNvPr id="33" name="Straight Arrow Connector 32"/>
+          <p:cNvCxnSpPr/>
+          <p:nvPr/>
+        </p:nvCxnSpPr>
+        <p:spPr>
+          <a:xfrm>
+            <a:off x="7050881" y="4876796"/>
+            <a:ext cx="0" cy="228600"/>
+          </a:xfrm>
+          <a:prstGeom prst="straightConnector1">
+            <a:avLst/>
+          </a:prstGeom>
+          <a:ln w="15875">
+            <a:solidFill>
+              <a:schemeClr val="tx2"/>
+            </a:solidFill>
+            <a:prstDash val="solid"/>
+            <a:tailEnd type="arrow"/>
+          </a:ln>
+        </p:spPr>
+        <p:style>
+          <a:lnRef idx="1">
+            <a:schemeClr val="accent1"/>
+          </a:lnRef>
+          <a:fillRef idx="0">
+            <a:schemeClr val="accent1"/>
+          </a:fillRef>
+          <a:effectRef idx="0">
+            <a:schemeClr val="accent1"/>
+          </a:effectRef>
+          <a:fontRef idx="minor">
+            <a:schemeClr val="tx1"/>
+          </a:fontRef>
+        </p:style>
+      </p:cxnSp>
+      <p:cxnSp>
+        <p:nvCxnSpPr>
+          <p:cNvPr id="34" name="Straight Arrow Connector 33"/>
+          <p:cNvCxnSpPr/>
+          <p:nvPr/>
+        </p:nvCxnSpPr>
+        <p:spPr>
+          <a:xfrm>
+            <a:off x="8320881" y="4870980"/>
+            <a:ext cx="0" cy="228600"/>
+          </a:xfrm>
+          <a:prstGeom prst="straightConnector1">
+            <a:avLst/>
+          </a:prstGeom>
+          <a:ln w="15875">
+            <a:solidFill>
+              <a:schemeClr val="tx2"/>
+            </a:solidFill>
+            <a:prstDash val="solid"/>
+            <a:tailEnd type="arrow"/>
+          </a:ln>
+        </p:spPr>
+        <p:style>
+          <a:lnRef idx="1">
+            <a:schemeClr val="accent1"/>
+          </a:lnRef>
+          <a:fillRef idx="0">
+            <a:schemeClr val="accent1"/>
+          </a:fillRef>
+          <a:effectRef idx="0">
+            <a:schemeClr val="accent1"/>
+          </a:effectRef>
+          <a:fontRef idx="minor">
+            <a:schemeClr val="tx1"/>
+          </a:fontRef>
+        </p:style>
+      </p:cxnSp>
+      <p:sp>
+        <p:nvSpPr>
+          <p:cNvPr id="112" name="Rectangle 15"/>
+          <p:cNvSpPr>
+            <a:spLocks noChangeArrowheads="1"/>
+          </p:cNvSpPr>
+          <p:nvPr/>
+        </p:nvSpPr>
+        <p:spPr bwMode="auto">
+          <a:xfrm>
+            <a:off x="152400" y="2037244"/>
+            <a:ext cx="1096963" cy="700247"/>
+          </a:xfrm>
+          <a:prstGeom prst="rect">
+            <a:avLst/>
+          </a:prstGeom>
+          <a:solidFill>
+            <a:srgbClr val="FFFFCC"/>
+          </a:solidFill>
+          <a:ln w="63500" algn="ctr">
+            <a:solidFill>
+              <a:schemeClr val="tx1"/>
+            </a:solidFill>
+            <a:miter lim="800000"/>
+            <a:headEnd/>
+            <a:tailEnd/>
+          </a:ln>
+        </p:spPr>
+        <p:txBody>
+          <a:bodyPr wrap="none" anchor="b" anchorCtr="1"/>
+          <a:lstStyle/>
+          <a:p>
+            <a:pPr algn="ctr"/>
+            <a:r>
+              <a:rPr lang="en-US" sz="1400" b="1" dirty="0" err="1" smtClean="0">
+                <a:solidFill>
+                  <a:srgbClr val="0959A5"/>
+                </a:solidFill>
+              </a:rPr>
+              <a:t>InflowWind</a:t>
+            </a:r>
+            <a:r>
+              <a:rPr lang="en-US" sz="1100" dirty="0" smtClean="0">
+                <a:solidFill>
+                  <a:srgbClr val="0959A5"/>
+                </a:solidFill>
+              </a:rPr>
+              <a:t/>
+            </a:r>
+            <a:br>
+              <a:rPr lang="en-US" sz="1100" dirty="0" smtClean="0">
+                <a:solidFill>
+                  <a:srgbClr val="0959A5"/>
+                </a:solidFill>
+              </a:rPr>
+            </a:br>
+            <a:endParaRPr lang="en-US" sz="1100" dirty="0">
+              <a:solidFill>
+                <a:srgbClr val="0959A5"/>
+              </a:solidFill>
+            </a:endParaRPr>
+          </a:p>
+        </p:txBody>
+      </p:sp>
+      <p:cxnSp>
+        <p:nvCxnSpPr>
+          <p:cNvPr id="116" name="Straight Arrow Connector 115"/>
+          <p:cNvCxnSpPr/>
+          <p:nvPr/>
+        </p:nvCxnSpPr>
+        <p:spPr>
+          <a:xfrm flipH="1">
+            <a:off x="700880" y="2743200"/>
+            <a:ext cx="2" cy="336374"/>
+          </a:xfrm>
+          <a:prstGeom prst="straightConnector1">
+            <a:avLst/>
+          </a:prstGeom>
+          <a:ln w="15875">
+            <a:solidFill>
+              <a:schemeClr val="tx2"/>
+            </a:solidFill>
+            <a:tailEnd type="arrow"/>
+          </a:ln>
+        </p:spPr>
+        <p:style>
+          <a:lnRef idx="1">
+            <a:schemeClr val="accent1"/>
+          </a:lnRef>
+          <a:fillRef idx="0">
+            <a:schemeClr val="accent1"/>
+          </a:fillRef>
+          <a:effectRef idx="0">
+            <a:schemeClr val="accent1"/>
+          </a:effectRef>
+          <a:fontRef idx="minor">
+            <a:schemeClr val="tx1"/>
+          </a:fontRef>
+        </p:style>
+      </p:cxnSp>
+    </p:spTree>
+    <p:extLst>
+      <p:ext uri="{BB962C8B-B14F-4D97-AF65-F5344CB8AC3E}">
+        <p14:creationId xmlns:p14="http://schemas.microsoft.com/office/powerpoint/2010/main" val="1351049608"/>
+      </p:ext>
+    </p:extLst>
+  </p:cSld>
+  <p:clrMapOvr>
+    <a:masterClrMapping/>
+  </p:clrMapOvr>
+  <p:transition>
+    <p:fade/>
+  </p:transition>
+  <p:timing>
+    <p:tnLst>
+      <p:par>
+        <p:cTn id="1" dur="indefinite" restart="never" nodeType="tmRoot"/>
+      </p:par>
+    </p:tnLst>
+  </p:timing>
+</p:sld>
+</file>
+
+<file path=ppt/slides/slide7.xml><?xml version="1.0" encoding="utf-8"?>
+<p:sld xmlns:a="http://schemas.openxmlformats.org/drawingml/2006/main" xmlns:r="http://schemas.openxmlformats.org/officeDocument/2006/relationships" xmlns:p="http://schemas.openxmlformats.org/presentationml/2006/main">
+  <p:cSld>
+    <p:spTree>
+      <p:nvGrpSpPr>
+        <p:cNvPr id="1" name=""/>
+        <p:cNvGrpSpPr/>
+        <p:nvPr/>
+      </p:nvGrpSpPr>
+      <p:grpSpPr>
+        <a:xfrm>
+          <a:off x="0" y="0"/>
+          <a:ext cx="0" cy="0"/>
+          <a:chOff x="0" y="0"/>
+          <a:chExt cx="0" cy="0"/>
+        </a:xfrm>
+      </p:grpSpPr>
+      <p:sp>
+        <p:nvSpPr>
+          <p:cNvPr id="4" name="Rectangle 13"/>
+          <p:cNvSpPr>
+            <a:spLocks noChangeArrowheads="1"/>
+          </p:cNvSpPr>
+          <p:nvPr/>
+        </p:nvSpPr>
+        <p:spPr bwMode="auto">
+          <a:xfrm>
+            <a:off x="6502400" y="3109748"/>
+            <a:ext cx="1096963" cy="1767047"/>
+          </a:xfrm>
+          <a:prstGeom prst="rect">
+            <a:avLst/>
+          </a:prstGeom>
+          <a:solidFill>
+            <a:srgbClr val="FFFFCC"/>
+          </a:solidFill>
+          <a:ln w="63500" cmpd="sng" algn="ctr">
+            <a:solidFill>
+              <a:schemeClr val="tx1"/>
+            </a:solidFill>
+            <a:prstDash val="solid"/>
+            <a:miter lim="800000"/>
+            <a:headEnd/>
+            <a:tailEnd/>
+          </a:ln>
+        </p:spPr>
+        <p:txBody>
+          <a:bodyPr wrap="none" anchor="b" anchorCtr="1"/>
+          <a:lstStyle/>
+          <a:p>
+            <a:pPr algn="ctr"/>
+            <a:r>
+              <a:rPr lang="en-US" sz="1400" b="1" dirty="0" err="1">
+                <a:solidFill>
+                  <a:srgbClr val="0959A5"/>
+                </a:solidFill>
+              </a:rPr>
+              <a:t>SubDyn</a:t>
+            </a:r>
+            <a:r>
+              <a:rPr lang="en-US" sz="1100" dirty="0">
+                <a:solidFill>
+                  <a:srgbClr val="0959A5"/>
+                </a:solidFill>
+              </a:rPr>
+              <a:t/>
+            </a:r>
+            <a:br>
+              <a:rPr lang="en-US" sz="1100" dirty="0">
+                <a:solidFill>
+                  <a:srgbClr val="0959A5"/>
+                </a:solidFill>
+              </a:rPr>
+            </a:br>
+            <a:r>
+              <a:rPr lang="en-US" sz="1100" dirty="0">
+                <a:solidFill>
+                  <a:srgbClr val="0959A5"/>
+                </a:solidFill>
+              </a:rPr>
+              <a:t>Multi-Member</a:t>
+            </a:r>
+          </a:p>
+          <a:p>
+            <a:pPr algn="ctr"/>
+            <a:r>
+              <a:rPr lang="en-US" sz="1100" dirty="0" err="1">
+                <a:solidFill>
+                  <a:srgbClr val="0959A5"/>
+                </a:solidFill>
+              </a:rPr>
+              <a:t>Substruct</a:t>
+            </a:r>
+            <a:r>
+              <a:rPr lang="en-US" sz="1100" dirty="0">
+                <a:solidFill>
+                  <a:srgbClr val="0959A5"/>
+                </a:solidFill>
+              </a:rPr>
+              <a:t>. </a:t>
+            </a:r>
+            <a:r>
+              <a:rPr lang="en-US" sz="1100" dirty="0" err="1">
+                <a:solidFill>
+                  <a:srgbClr val="0959A5"/>
+                </a:solidFill>
+              </a:rPr>
+              <a:t>Dyn</a:t>
+            </a:r>
+            <a:r>
+              <a:rPr lang="en-US" sz="1100" dirty="0">
+                <a:solidFill>
+                  <a:srgbClr val="0959A5"/>
+                </a:solidFill>
+              </a:rPr>
+              <a:t>.</a:t>
+            </a:r>
+          </a:p>
+        </p:txBody>
+      </p:sp>
+      <p:sp>
+        <p:nvSpPr>
+          <p:cNvPr id="5" name="Rectangle 14"/>
+          <p:cNvSpPr>
+            <a:spLocks noChangeArrowheads="1"/>
+          </p:cNvSpPr>
+          <p:nvPr/>
+        </p:nvSpPr>
+        <p:spPr bwMode="auto">
+          <a:xfrm>
+            <a:off x="3886200" y="3109748"/>
+            <a:ext cx="1214851" cy="1767047"/>
+          </a:xfrm>
+          <a:prstGeom prst="rect">
+            <a:avLst/>
+          </a:prstGeom>
+          <a:solidFill>
+            <a:srgbClr val="FFFFCC"/>
+          </a:solidFill>
+          <a:ln w="63500" algn="ctr">
+            <a:solidFill>
+              <a:schemeClr val="tx1"/>
+            </a:solidFill>
+            <a:miter lim="800000"/>
+            <a:headEnd/>
+            <a:tailEnd/>
+          </a:ln>
+        </p:spPr>
+        <p:txBody>
+          <a:bodyPr wrap="none" anchor="b" anchorCtr="1"/>
+          <a:lstStyle/>
+          <a:p>
+            <a:pPr algn="ctr"/>
+            <a:r>
+              <a:rPr lang="en-US" sz="1400" b="1" dirty="0" err="1">
+                <a:solidFill>
+                  <a:srgbClr val="0959A5"/>
+                </a:solidFill>
+              </a:rPr>
+              <a:t>ElastoDyn</a:t>
+            </a:r>
+            <a:endParaRPr lang="en-US" sz="1400" b="1" dirty="0">
+              <a:solidFill>
+                <a:srgbClr val="0959A5"/>
+              </a:solidFill>
+            </a:endParaRPr>
+          </a:p>
+          <a:p>
+            <a:pPr algn="ctr"/>
+            <a:r>
+              <a:rPr lang="en-US" sz="1100" dirty="0">
+                <a:solidFill>
+                  <a:srgbClr val="0959A5"/>
+                </a:solidFill>
+              </a:rPr>
+              <a:t>Structural</a:t>
+            </a:r>
+            <a:br>
+              <a:rPr lang="en-US" sz="1100" dirty="0">
+                <a:solidFill>
+                  <a:srgbClr val="0959A5"/>
+                </a:solidFill>
+              </a:rPr>
+            </a:br>
+            <a:r>
+              <a:rPr lang="en-US" sz="1100" dirty="0">
+                <a:solidFill>
+                  <a:srgbClr val="0959A5"/>
+                </a:solidFill>
+              </a:rPr>
+              <a:t>Dynamics</a:t>
+            </a:r>
+          </a:p>
+        </p:txBody>
+      </p:sp>
+      <p:sp>
+        <p:nvSpPr>
+          <p:cNvPr id="6" name="Rectangle 20"/>
+          <p:cNvSpPr>
+            <a:spLocks noChangeArrowheads="1"/>
+          </p:cNvSpPr>
+          <p:nvPr/>
+        </p:nvSpPr>
+        <p:spPr bwMode="auto">
+          <a:xfrm>
+            <a:off x="7772400" y="3109748"/>
+            <a:ext cx="1096963" cy="1767047"/>
+          </a:xfrm>
+          <a:prstGeom prst="rect">
+            <a:avLst/>
+          </a:prstGeom>
+          <a:solidFill>
+            <a:srgbClr val="FFFFCC"/>
+          </a:solidFill>
+          <a:ln w="63500" algn="ctr">
+            <a:solidFill>
+              <a:schemeClr val="tx1"/>
+            </a:solidFill>
+            <a:prstDash val="solid"/>
+            <a:miter lim="800000"/>
+            <a:headEnd/>
+            <a:tailEnd/>
+          </a:ln>
+        </p:spPr>
+        <p:txBody>
+          <a:bodyPr wrap="none" anchor="b" anchorCtr="1"/>
+          <a:lstStyle/>
+          <a:p>
+            <a:pPr algn="ctr"/>
+            <a:r>
+              <a:rPr lang="en-US" sz="1400" b="1" dirty="0">
+                <a:solidFill>
+                  <a:srgbClr val="0959A5"/>
+                </a:solidFill>
+              </a:rPr>
+              <a:t>MAP</a:t>
+            </a:r>
+          </a:p>
+          <a:p>
+            <a:pPr algn="ctr"/>
+            <a:r>
+              <a:rPr lang="en-US" sz="1100" dirty="0">
+                <a:solidFill>
+                  <a:srgbClr val="0959A5"/>
+                </a:solidFill>
+              </a:rPr>
+              <a:t>Mooring Statics</a:t>
+            </a:r>
+          </a:p>
+          <a:p>
+            <a:pPr algn="ctr"/>
+            <a:r>
+              <a:rPr lang="en-US" sz="1100" dirty="0">
+                <a:solidFill>
+                  <a:srgbClr val="0959A5"/>
+                </a:solidFill>
+              </a:rPr>
+              <a:t>&amp; Dynamics</a:t>
+            </a:r>
+          </a:p>
+        </p:txBody>
+      </p:sp>
+      <p:sp>
+        <p:nvSpPr>
+          <p:cNvPr id="9" name="Rectangle 45"/>
+          <p:cNvSpPr>
+            <a:spLocks noChangeArrowheads="1"/>
+          </p:cNvSpPr>
+          <p:nvPr/>
+        </p:nvSpPr>
+        <p:spPr bwMode="auto">
+          <a:xfrm>
+            <a:off x="5232400" y="3109748"/>
+            <a:ext cx="1096963" cy="1767047"/>
+          </a:xfrm>
+          <a:prstGeom prst="rect">
+            <a:avLst/>
+          </a:prstGeom>
+          <a:solidFill>
+            <a:srgbClr val="FFFFCC"/>
+          </a:solidFill>
+          <a:ln w="63500" algn="ctr">
+            <a:solidFill>
+              <a:schemeClr val="tx1"/>
+            </a:solidFill>
+            <a:prstDash val="sysDash"/>
+            <a:miter lim="800000"/>
+            <a:headEnd/>
+            <a:tailEnd/>
+          </a:ln>
+        </p:spPr>
+        <p:txBody>
+          <a:bodyPr wrap="none" anchor="b" anchorCtr="1"/>
+          <a:lstStyle/>
+          <a:p>
+            <a:pPr algn="ctr"/>
+            <a:r>
+              <a:rPr lang="en-US" sz="1400" b="1" dirty="0" err="1">
+                <a:solidFill>
+                  <a:srgbClr val="0959A5"/>
+                </a:solidFill>
+              </a:rPr>
+              <a:t>BeamDyn</a:t>
+            </a:r>
+            <a:endParaRPr lang="en-US" sz="1400" b="1" dirty="0">
+              <a:solidFill>
+                <a:srgbClr val="0959A5"/>
+              </a:solidFill>
+            </a:endParaRPr>
+          </a:p>
+          <a:p>
+            <a:pPr algn="ctr"/>
+            <a:r>
+              <a:rPr lang="en-US" sz="1100" dirty="0">
+                <a:solidFill>
+                  <a:srgbClr val="0959A5"/>
+                </a:solidFill>
+              </a:rPr>
+              <a:t>Nonlinear FE</a:t>
+            </a:r>
+          </a:p>
+          <a:p>
+            <a:pPr algn="ctr"/>
+            <a:r>
+              <a:rPr lang="en-US" sz="1100" dirty="0">
+                <a:solidFill>
+                  <a:srgbClr val="0959A5"/>
+                </a:solidFill>
+              </a:rPr>
+              <a:t>Blade Dynamics</a:t>
+            </a:r>
+          </a:p>
+        </p:txBody>
+      </p:sp>
+      <p:sp>
+        <p:nvSpPr>
+          <p:cNvPr id="10" name="Rectangle 16"/>
+          <p:cNvSpPr>
+            <a:spLocks noChangeArrowheads="1"/>
+          </p:cNvSpPr>
+          <p:nvPr/>
+        </p:nvSpPr>
+        <p:spPr bwMode="auto">
+          <a:xfrm>
+            <a:off x="2692400" y="3109748"/>
+            <a:ext cx="1096963" cy="1767048"/>
+          </a:xfrm>
+          <a:prstGeom prst="rect">
+            <a:avLst/>
+          </a:prstGeom>
+          <a:solidFill>
+            <a:srgbClr val="FFFFCC"/>
+          </a:solidFill>
+          <a:ln w="63500" algn="ctr">
+            <a:solidFill>
+              <a:schemeClr val="tx1"/>
+            </a:solidFill>
+            <a:miter lim="800000"/>
+            <a:headEnd/>
+            <a:tailEnd/>
+          </a:ln>
+        </p:spPr>
+        <p:txBody>
+          <a:bodyPr wrap="none" anchor="b" anchorCtr="1"/>
+          <a:lstStyle/>
+          <a:p>
+            <a:pPr algn="ctr"/>
+            <a:r>
+              <a:rPr lang="en-US" sz="1400" b="1" dirty="0" err="1">
+                <a:solidFill>
+                  <a:srgbClr val="0959A5"/>
+                </a:solidFill>
+              </a:rPr>
+              <a:t>ServoDyn</a:t>
+            </a:r>
+            <a:endParaRPr lang="en-US" sz="1400" b="1" dirty="0">
+              <a:solidFill>
+                <a:srgbClr val="0959A5"/>
+              </a:solidFill>
+            </a:endParaRPr>
+          </a:p>
+          <a:p>
+            <a:pPr algn="ctr"/>
+            <a:r>
+              <a:rPr lang="en-US" sz="1100" dirty="0">
+                <a:solidFill>
+                  <a:srgbClr val="0959A5"/>
+                </a:solidFill>
+              </a:rPr>
+              <a:t>Control &amp;</a:t>
+            </a:r>
+            <a:br>
+              <a:rPr lang="en-US" sz="1100" dirty="0">
+                <a:solidFill>
+                  <a:srgbClr val="0959A5"/>
+                </a:solidFill>
+              </a:rPr>
+            </a:br>
+            <a:r>
+              <a:rPr lang="en-US" sz="1100" dirty="0">
+                <a:solidFill>
+                  <a:srgbClr val="0959A5"/>
+                </a:solidFill>
+              </a:rPr>
+              <a:t>Electrical Drive</a:t>
+            </a:r>
+          </a:p>
+        </p:txBody>
+      </p:sp>
+      <p:sp>
+        <p:nvSpPr>
+          <p:cNvPr id="11" name="Rectangle 16"/>
+          <p:cNvSpPr>
+            <a:spLocks noChangeArrowheads="1"/>
+          </p:cNvSpPr>
+          <p:nvPr/>
+        </p:nvSpPr>
+        <p:spPr bwMode="auto">
+          <a:xfrm rot="5400000">
+            <a:off x="3825079" y="1432717"/>
+            <a:ext cx="1371603" cy="8716962"/>
+          </a:xfrm>
+          <a:prstGeom prst="rect">
+            <a:avLst/>
+          </a:prstGeom>
+          <a:solidFill>
+            <a:srgbClr val="FFFFCC"/>
+          </a:solidFill>
+          <a:ln w="63500" algn="ctr">
+            <a:solidFill>
+              <a:schemeClr val="tx1"/>
+            </a:solidFill>
+            <a:miter lim="800000"/>
+            <a:headEnd/>
+            <a:tailEnd/>
+          </a:ln>
+        </p:spPr>
+        <p:txBody>
+          <a:bodyPr vert="vert270" wrap="none" anchor="b" anchorCtr="1"/>
+          <a:lstStyle/>
+          <a:p>
+            <a:pPr algn="ctr"/>
+            <a:r>
+              <a:rPr lang="en-US" sz="1800" b="1" dirty="0">
+                <a:solidFill>
+                  <a:srgbClr val="0959A5"/>
+                </a:solidFill>
+              </a:rPr>
+              <a:t>FAST</a:t>
+            </a:r>
+          </a:p>
+          <a:p>
+            <a:pPr algn="ctr"/>
+            <a:r>
+              <a:rPr lang="en-US" sz="1200" dirty="0">
+                <a:solidFill>
+                  <a:srgbClr val="0959A5"/>
+                </a:solidFill>
+              </a:rPr>
+              <a:t>Driver</a:t>
+            </a:r>
+            <a:endParaRPr lang="en-US" sz="1400" dirty="0">
+              <a:solidFill>
+                <a:srgbClr val="0959A5"/>
+              </a:solidFill>
+            </a:endParaRPr>
+          </a:p>
+        </p:txBody>
+      </p:sp>
+      <p:sp>
+        <p:nvSpPr>
+          <p:cNvPr id="12" name="Rectangle 15"/>
+          <p:cNvSpPr>
+            <a:spLocks noChangeArrowheads="1"/>
+          </p:cNvSpPr>
+          <p:nvPr/>
+        </p:nvSpPr>
+        <p:spPr bwMode="auto">
+          <a:xfrm>
+            <a:off x="152400" y="3109748"/>
+            <a:ext cx="1096963" cy="1767047"/>
+          </a:xfrm>
+          <a:prstGeom prst="rect">
+            <a:avLst/>
+          </a:prstGeom>
+          <a:solidFill>
+            <a:srgbClr val="FFFFCC"/>
+          </a:solidFill>
+          <a:ln w="63500" algn="ctr">
+            <a:solidFill>
+              <a:schemeClr val="tx1"/>
+            </a:solidFill>
+            <a:miter lim="800000"/>
+            <a:headEnd/>
+            <a:tailEnd/>
+          </a:ln>
+        </p:spPr>
+        <p:txBody>
+          <a:bodyPr wrap="none" anchor="b" anchorCtr="1"/>
+          <a:lstStyle/>
+          <a:p>
+            <a:pPr algn="ctr"/>
+            <a:r>
+              <a:rPr lang="en-US" sz="1400" b="1" dirty="0">
+                <a:solidFill>
+                  <a:srgbClr val="0959A5"/>
+                </a:solidFill>
+              </a:rPr>
+              <a:t>AeroDyn</a:t>
+            </a:r>
+          </a:p>
+          <a:p>
+            <a:pPr algn="ctr"/>
+            <a:r>
+              <a:rPr lang="en-US" sz="1100" dirty="0" smtClean="0">
+                <a:solidFill>
+                  <a:srgbClr val="0959A5"/>
+                </a:solidFill>
+              </a:rPr>
+              <a:t>Aerodynamics</a:t>
+            </a:r>
+            <a:br>
+              <a:rPr lang="en-US" sz="1100" dirty="0" smtClean="0">
+                <a:solidFill>
+                  <a:srgbClr val="0959A5"/>
+                </a:solidFill>
+              </a:rPr>
+            </a:br>
+            <a:endParaRPr lang="en-US" sz="1100" dirty="0">
+              <a:solidFill>
+                <a:srgbClr val="0959A5"/>
+              </a:solidFill>
+            </a:endParaRPr>
+          </a:p>
+        </p:txBody>
+      </p:sp>
+      <p:sp>
+        <p:nvSpPr>
+          <p:cNvPr id="13" name="Rectangle 42"/>
+          <p:cNvSpPr>
+            <a:spLocks noChangeArrowheads="1"/>
+          </p:cNvSpPr>
+          <p:nvPr/>
+        </p:nvSpPr>
+        <p:spPr bwMode="auto">
+          <a:xfrm>
+            <a:off x="1371600" y="3109748"/>
+            <a:ext cx="1219200" cy="1767047"/>
+          </a:xfrm>
+          <a:prstGeom prst="rect">
+            <a:avLst/>
+          </a:prstGeom>
+          <a:solidFill>
+            <a:srgbClr val="FFFFCC"/>
+          </a:solidFill>
+          <a:ln w="63500" cmpd="sng" algn="ctr">
+            <a:solidFill>
+              <a:schemeClr val="tx1"/>
+            </a:solidFill>
+            <a:prstDash val="solid"/>
+            <a:miter lim="800000"/>
+            <a:headEnd/>
+            <a:tailEnd/>
+          </a:ln>
+        </p:spPr>
+        <p:txBody>
+          <a:bodyPr wrap="none" anchor="b" anchorCtr="1"/>
+          <a:lstStyle/>
+          <a:p>
+            <a:pPr algn="ctr"/>
+            <a:r>
+              <a:rPr lang="en-US" sz="1400" b="1" dirty="0" err="1">
+                <a:solidFill>
+                  <a:srgbClr val="0959A5"/>
+                </a:solidFill>
+              </a:rPr>
+              <a:t>HydroDyn</a:t>
+            </a:r>
+            <a:endParaRPr lang="en-US" sz="1400" b="1" dirty="0">
+              <a:solidFill>
+                <a:srgbClr val="0959A5"/>
+              </a:solidFill>
+            </a:endParaRPr>
+          </a:p>
+          <a:p>
+            <a:pPr algn="ctr"/>
+            <a:r>
+              <a:rPr lang="en-US" sz="1100" dirty="0" smtClean="0">
+                <a:solidFill>
+                  <a:srgbClr val="0959A5"/>
+                </a:solidFill>
+              </a:rPr>
+              <a:t>Hydrodynamics</a:t>
+            </a:r>
+            <a:br>
+              <a:rPr lang="en-US" sz="1100" dirty="0" smtClean="0">
+                <a:solidFill>
+                  <a:srgbClr val="0959A5"/>
+                </a:solidFill>
+              </a:rPr>
+            </a:br>
+            <a:endParaRPr lang="en-US" sz="1100" dirty="0">
+              <a:solidFill>
+                <a:srgbClr val="0959A5"/>
+              </a:solidFill>
+            </a:endParaRPr>
+          </a:p>
+        </p:txBody>
+      </p:sp>
+      <p:cxnSp>
+        <p:nvCxnSpPr>
+          <p:cNvPr id="26" name="Straight Arrow Connector 25"/>
+          <p:cNvCxnSpPr/>
+          <p:nvPr/>
+        </p:nvCxnSpPr>
+        <p:spPr>
+          <a:xfrm flipH="1">
+            <a:off x="700880" y="4870980"/>
+            <a:ext cx="1" cy="228600"/>
+          </a:xfrm>
+          <a:prstGeom prst="straightConnector1">
+            <a:avLst/>
+          </a:prstGeom>
+          <a:ln w="15875">
+            <a:solidFill>
+              <a:schemeClr val="tx2"/>
+            </a:solidFill>
+            <a:tailEnd type="arrow"/>
+          </a:ln>
+        </p:spPr>
+        <p:style>
+          <a:lnRef idx="1">
+            <a:schemeClr val="accent1"/>
+          </a:lnRef>
+          <a:fillRef idx="0">
+            <a:schemeClr val="accent1"/>
+          </a:fillRef>
+          <a:effectRef idx="0">
+            <a:schemeClr val="accent1"/>
+          </a:effectRef>
+          <a:fontRef idx="minor">
+            <a:schemeClr val="tx1"/>
+          </a:fontRef>
+        </p:style>
+      </p:cxnSp>
+      <p:cxnSp>
+        <p:nvCxnSpPr>
+          <p:cNvPr id="29" name="Straight Arrow Connector 28"/>
+          <p:cNvCxnSpPr/>
+          <p:nvPr/>
+        </p:nvCxnSpPr>
+        <p:spPr>
+          <a:xfrm flipH="1">
+            <a:off x="1945733" y="4870980"/>
+            <a:ext cx="1814" cy="228600"/>
+          </a:xfrm>
+          <a:prstGeom prst="straightConnector1">
+            <a:avLst/>
+          </a:prstGeom>
+          <a:ln w="15875">
+            <a:solidFill>
+              <a:schemeClr val="tx2"/>
+            </a:solidFill>
+            <a:tailEnd type="arrow"/>
+          </a:ln>
+        </p:spPr>
+        <p:style>
+          <a:lnRef idx="1">
+            <a:schemeClr val="accent1"/>
+          </a:lnRef>
+          <a:fillRef idx="0">
+            <a:schemeClr val="accent1"/>
+          </a:fillRef>
+          <a:effectRef idx="0">
+            <a:schemeClr val="accent1"/>
+          </a:effectRef>
+          <a:fontRef idx="minor">
+            <a:schemeClr val="tx1"/>
+          </a:fontRef>
+        </p:style>
+      </p:cxnSp>
+      <p:cxnSp>
+        <p:nvCxnSpPr>
+          <p:cNvPr id="30" name="Straight Arrow Connector 29"/>
+          <p:cNvCxnSpPr/>
+          <p:nvPr/>
+        </p:nvCxnSpPr>
+        <p:spPr>
+          <a:xfrm>
+            <a:off x="3240881" y="4860900"/>
+            <a:ext cx="0" cy="228600"/>
+          </a:xfrm>
+          <a:prstGeom prst="straightConnector1">
+            <a:avLst/>
+          </a:prstGeom>
+          <a:ln w="15875">
+            <a:solidFill>
+              <a:schemeClr val="tx2"/>
+            </a:solidFill>
+            <a:tailEnd type="arrow"/>
+          </a:ln>
+        </p:spPr>
+        <p:style>
+          <a:lnRef idx="1">
+            <a:schemeClr val="accent1"/>
+          </a:lnRef>
+          <a:fillRef idx="0">
+            <a:schemeClr val="accent1"/>
+          </a:fillRef>
+          <a:effectRef idx="0">
+            <a:schemeClr val="accent1"/>
+          </a:effectRef>
+          <a:fontRef idx="minor">
+            <a:schemeClr val="tx1"/>
+          </a:fontRef>
+        </p:style>
+      </p:cxnSp>
+      <p:cxnSp>
+        <p:nvCxnSpPr>
+          <p:cNvPr id="31" name="Straight Arrow Connector 30"/>
+          <p:cNvCxnSpPr/>
+          <p:nvPr/>
+        </p:nvCxnSpPr>
+        <p:spPr>
+          <a:xfrm>
+            <a:off x="4502661" y="4870980"/>
+            <a:ext cx="0" cy="228600"/>
+          </a:xfrm>
+          <a:prstGeom prst="straightConnector1">
+            <a:avLst/>
+          </a:prstGeom>
+          <a:ln w="15875">
+            <a:solidFill>
+              <a:schemeClr val="tx2"/>
+            </a:solidFill>
+            <a:tailEnd type="arrow"/>
+          </a:ln>
+        </p:spPr>
+        <p:style>
+          <a:lnRef idx="1">
+            <a:schemeClr val="accent1"/>
+          </a:lnRef>
+          <a:fillRef idx="0">
+            <a:schemeClr val="accent1"/>
+          </a:fillRef>
+          <a:effectRef idx="0">
+            <a:schemeClr val="accent1"/>
+          </a:effectRef>
+          <a:fontRef idx="minor">
+            <a:schemeClr val="tx1"/>
+          </a:fontRef>
+        </p:style>
+      </p:cxnSp>
+      <p:cxnSp>
+        <p:nvCxnSpPr>
+          <p:cNvPr id="32" name="Straight Arrow Connector 31"/>
+          <p:cNvCxnSpPr/>
+          <p:nvPr/>
+        </p:nvCxnSpPr>
+        <p:spPr>
+          <a:xfrm>
+            <a:off x="5780881" y="4870980"/>
+            <a:ext cx="0" cy="228600"/>
+          </a:xfrm>
+          <a:prstGeom prst="straightConnector1">
+            <a:avLst/>
+          </a:prstGeom>
+          <a:ln w="15875">
+            <a:solidFill>
+              <a:schemeClr val="tx2"/>
+            </a:solidFill>
+            <a:prstDash val="dash"/>
+            <a:tailEnd type="arrow"/>
+          </a:ln>
+        </p:spPr>
+        <p:style>
+          <a:lnRef idx="1">
+            <a:schemeClr val="accent1"/>
+          </a:lnRef>
+          <a:fillRef idx="0">
+            <a:schemeClr val="accent1"/>
+          </a:fillRef>
+          <a:effectRef idx="0">
+            <a:schemeClr val="accent1"/>
+          </a:effectRef>
+          <a:fontRef idx="minor">
+            <a:schemeClr val="tx1"/>
+          </a:fontRef>
+        </p:style>
+      </p:cxnSp>
+      <p:cxnSp>
+        <p:nvCxnSpPr>
+          <p:cNvPr id="33" name="Straight Arrow Connector 32"/>
+          <p:cNvCxnSpPr/>
+          <p:nvPr/>
+        </p:nvCxnSpPr>
+        <p:spPr>
+          <a:xfrm>
+            <a:off x="7050881" y="4876796"/>
+            <a:ext cx="0" cy="228600"/>
+          </a:xfrm>
+          <a:prstGeom prst="straightConnector1">
+            <a:avLst/>
+          </a:prstGeom>
+          <a:ln w="15875">
+            <a:solidFill>
+              <a:schemeClr val="tx2"/>
+            </a:solidFill>
+            <a:prstDash val="solid"/>
+            <a:tailEnd type="arrow"/>
+          </a:ln>
+        </p:spPr>
+        <p:style>
+          <a:lnRef idx="1">
+            <a:schemeClr val="accent1"/>
+          </a:lnRef>
+          <a:fillRef idx="0">
+            <a:schemeClr val="accent1"/>
+          </a:fillRef>
+          <a:effectRef idx="0">
+            <a:schemeClr val="accent1"/>
+          </a:effectRef>
+          <a:fontRef idx="minor">
+            <a:schemeClr val="tx1"/>
+          </a:fontRef>
+        </p:style>
+      </p:cxnSp>
+      <p:cxnSp>
+        <p:nvCxnSpPr>
+          <p:cNvPr id="34" name="Straight Arrow Connector 33"/>
+          <p:cNvCxnSpPr/>
+          <p:nvPr/>
+        </p:nvCxnSpPr>
+        <p:spPr>
+          <a:xfrm>
+            <a:off x="8320881" y="4870980"/>
+            <a:ext cx="0" cy="228600"/>
+          </a:xfrm>
+          <a:prstGeom prst="straightConnector1">
+            <a:avLst/>
+          </a:prstGeom>
+          <a:ln w="15875">
+            <a:solidFill>
+              <a:schemeClr val="tx2"/>
+            </a:solidFill>
+            <a:prstDash val="solid"/>
+            <a:tailEnd type="arrow"/>
+          </a:ln>
+        </p:spPr>
+        <p:style>
+          <a:lnRef idx="1">
+            <a:schemeClr val="accent1"/>
+          </a:lnRef>
+          <a:fillRef idx="0">
+            <a:schemeClr val="accent1"/>
+          </a:fillRef>
+          <a:effectRef idx="0">
+            <a:schemeClr val="accent1"/>
+          </a:effectRef>
+          <a:fontRef idx="minor">
+            <a:schemeClr val="tx1"/>
+          </a:fontRef>
+        </p:style>
+      </p:cxnSp>
+      <p:sp>
+        <p:nvSpPr>
+          <p:cNvPr id="103" name="Rectangle 15"/>
+          <p:cNvSpPr>
+            <a:spLocks noChangeArrowheads="1"/>
+          </p:cNvSpPr>
+          <p:nvPr/>
+        </p:nvSpPr>
+        <p:spPr bwMode="auto">
+          <a:xfrm>
+            <a:off x="152400" y="2037244"/>
+            <a:ext cx="1096963" cy="700247"/>
+          </a:xfrm>
+          <a:prstGeom prst="rect">
+            <a:avLst/>
+          </a:prstGeom>
+          <a:solidFill>
+            <a:srgbClr val="FFFFCC"/>
+          </a:solidFill>
+          <a:ln w="63500" algn="ctr">
+            <a:solidFill>
+              <a:schemeClr val="tx1"/>
+            </a:solidFill>
+            <a:miter lim="800000"/>
+            <a:headEnd/>
+            <a:tailEnd/>
+          </a:ln>
+        </p:spPr>
+        <p:txBody>
+          <a:bodyPr wrap="none" anchor="b" anchorCtr="1"/>
+          <a:lstStyle/>
+          <a:p>
+            <a:pPr algn="ctr"/>
+            <a:r>
+              <a:rPr lang="en-US" sz="1400" b="1" dirty="0" err="1" smtClean="0">
+                <a:solidFill>
+                  <a:srgbClr val="0959A5"/>
+                </a:solidFill>
+              </a:rPr>
+              <a:t>InflowWind</a:t>
+            </a:r>
+            <a:r>
+              <a:rPr lang="en-US" sz="1100" dirty="0" smtClean="0">
+                <a:solidFill>
+                  <a:srgbClr val="0959A5"/>
+                </a:solidFill>
+              </a:rPr>
+              <a:t/>
+            </a:r>
+            <a:br>
+              <a:rPr lang="en-US" sz="1100" dirty="0" smtClean="0">
+                <a:solidFill>
+                  <a:srgbClr val="0959A5"/>
+                </a:solidFill>
+              </a:rPr>
+            </a:br>
+            <a:endParaRPr lang="en-US" sz="1100" dirty="0">
+              <a:solidFill>
+                <a:srgbClr val="0959A5"/>
+              </a:solidFill>
+            </a:endParaRPr>
+          </a:p>
+        </p:txBody>
+      </p:sp>
+      <p:cxnSp>
+        <p:nvCxnSpPr>
+          <p:cNvPr id="104" name="Straight Arrow Connector 103"/>
+          <p:cNvCxnSpPr/>
+          <p:nvPr/>
+        </p:nvCxnSpPr>
+        <p:spPr>
+          <a:xfrm flipH="1">
+            <a:off x="700880" y="2743200"/>
+            <a:ext cx="2" cy="336374"/>
+          </a:xfrm>
+          <a:prstGeom prst="straightConnector1">
+            <a:avLst/>
+          </a:prstGeom>
+          <a:ln w="15875">
+            <a:solidFill>
+              <a:schemeClr val="tx2"/>
+            </a:solidFill>
+            <a:tailEnd type="arrow"/>
+          </a:ln>
+        </p:spPr>
+        <p:style>
+          <a:lnRef idx="1">
+            <a:schemeClr val="accent1"/>
+          </a:lnRef>
+          <a:fillRef idx="0">
+            <a:schemeClr val="accent1"/>
+          </a:fillRef>
+          <a:effectRef idx="0">
+            <a:schemeClr val="accent1"/>
+          </a:effectRef>
+          <a:fontRef idx="minor">
+            <a:schemeClr val="tx1"/>
+          </a:fontRef>
+        </p:style>
+      </p:cxnSp>
+      <p:sp>
+        <p:nvSpPr>
+          <p:cNvPr id="20" name="Rectangle 15"/>
+          <p:cNvSpPr>
+            <a:spLocks noChangeArrowheads="1"/>
+          </p:cNvSpPr>
+          <p:nvPr/>
+        </p:nvSpPr>
+        <p:spPr bwMode="auto">
+          <a:xfrm>
+            <a:off x="1474503" y="1859676"/>
+            <a:ext cx="1096963" cy="883524"/>
+          </a:xfrm>
+          <a:prstGeom prst="rect">
+            <a:avLst/>
+          </a:prstGeom>
+          <a:solidFill>
+            <a:srgbClr val="FFFFCC"/>
+          </a:solidFill>
+          <a:ln w="63500" algn="ctr">
+            <a:solidFill>
+              <a:schemeClr val="tx1"/>
+            </a:solidFill>
+            <a:miter lim="800000"/>
+            <a:headEnd/>
+            <a:tailEnd/>
+          </a:ln>
+        </p:spPr>
+        <p:txBody>
+          <a:bodyPr wrap="none" anchor="b" anchorCtr="1"/>
+          <a:lstStyle/>
+          <a:p>
+            <a:pPr algn="ctr"/>
+            <a:r>
+              <a:rPr lang="en-US" sz="1400" b="1" dirty="0" smtClean="0">
+                <a:solidFill>
+                  <a:srgbClr val="0959A5"/>
+                </a:solidFill>
+              </a:rPr>
+              <a:t>DWM</a:t>
+            </a:r>
+            <a:r>
+              <a:rPr lang="en-US" sz="1100" dirty="0" smtClean="0">
+                <a:solidFill>
+                  <a:srgbClr val="0959A5"/>
+                </a:solidFill>
+              </a:rPr>
+              <a:t/>
+            </a:r>
+            <a:br>
+              <a:rPr lang="en-US" sz="1100" dirty="0" smtClean="0">
+                <a:solidFill>
+                  <a:srgbClr val="0959A5"/>
+                </a:solidFill>
+              </a:rPr>
+            </a:br>
+            <a:endParaRPr lang="en-US" sz="1100" dirty="0">
+              <a:solidFill>
+                <a:srgbClr val="0959A5"/>
+              </a:solidFill>
+            </a:endParaRPr>
+          </a:p>
+        </p:txBody>
+      </p:sp>
+      <p:sp>
+        <p:nvSpPr>
+          <p:cNvPr id="21" name="Rectangle 15"/>
+          <p:cNvSpPr>
+            <a:spLocks noChangeArrowheads="1"/>
+          </p:cNvSpPr>
+          <p:nvPr/>
+        </p:nvSpPr>
+        <p:spPr bwMode="auto">
+          <a:xfrm>
+            <a:off x="1447800" y="894244"/>
+            <a:ext cx="1096963" cy="700247"/>
+          </a:xfrm>
+          <a:prstGeom prst="rect">
+            <a:avLst/>
+          </a:prstGeom>
+          <a:solidFill>
+            <a:srgbClr val="FFFFCC"/>
+          </a:solidFill>
+          <a:ln w="63500" algn="ctr">
+            <a:solidFill>
+              <a:schemeClr val="tx1"/>
+            </a:solidFill>
+            <a:miter lim="800000"/>
+            <a:headEnd/>
+            <a:tailEnd/>
+          </a:ln>
+        </p:spPr>
+        <p:txBody>
+          <a:bodyPr wrap="none" anchor="b" anchorCtr="1"/>
+          <a:lstStyle/>
+          <a:p>
+            <a:pPr algn="ctr"/>
+            <a:r>
+              <a:rPr lang="en-US" sz="1400" b="1" dirty="0" err="1" smtClean="0">
+                <a:solidFill>
+                  <a:srgbClr val="0959A5"/>
+                </a:solidFill>
+              </a:rPr>
+              <a:t>InflowWind</a:t>
+            </a:r>
+            <a:r>
+              <a:rPr lang="en-US" sz="1100" dirty="0" smtClean="0">
+                <a:solidFill>
+                  <a:srgbClr val="0959A5"/>
+                </a:solidFill>
+              </a:rPr>
+              <a:t/>
+            </a:r>
+            <a:br>
+              <a:rPr lang="en-US" sz="1100" dirty="0" smtClean="0">
+                <a:solidFill>
+                  <a:srgbClr val="0959A5"/>
+                </a:solidFill>
+              </a:rPr>
+            </a:br>
+            <a:endParaRPr lang="en-US" sz="1100" dirty="0">
+              <a:solidFill>
+                <a:srgbClr val="0959A5"/>
+              </a:solidFill>
+            </a:endParaRPr>
+          </a:p>
+        </p:txBody>
+      </p:sp>
+      <p:cxnSp>
+        <p:nvCxnSpPr>
+          <p:cNvPr id="22" name="Straight Arrow Connector 21"/>
+          <p:cNvCxnSpPr/>
+          <p:nvPr/>
+        </p:nvCxnSpPr>
+        <p:spPr>
+          <a:xfrm flipH="1">
+            <a:off x="2030102" y="1631076"/>
+            <a:ext cx="1" cy="228600"/>
+          </a:xfrm>
+          <a:prstGeom prst="straightConnector1">
+            <a:avLst/>
+          </a:prstGeom>
+          <a:ln w="15875">
+            <a:solidFill>
+              <a:schemeClr val="tx2"/>
+            </a:solidFill>
+            <a:tailEnd type="arrow"/>
+          </a:ln>
+        </p:spPr>
+        <p:style>
+          <a:lnRef idx="1">
+            <a:schemeClr val="accent1"/>
+          </a:lnRef>
+          <a:fillRef idx="0">
+            <a:schemeClr val="accent1"/>
+          </a:fillRef>
+          <a:effectRef idx="0">
+            <a:schemeClr val="accent1"/>
+          </a:effectRef>
+          <a:fontRef idx="minor">
+            <a:schemeClr val="tx1"/>
+          </a:fontRef>
+        </p:style>
+      </p:cxnSp>
+      <p:cxnSp>
+        <p:nvCxnSpPr>
+          <p:cNvPr id="23" name="Straight Arrow Connector 22"/>
+          <p:cNvCxnSpPr/>
+          <p:nvPr/>
+        </p:nvCxnSpPr>
+        <p:spPr>
+          <a:xfrm flipH="1">
+            <a:off x="838200" y="2769885"/>
+            <a:ext cx="956186" cy="293744"/>
+          </a:xfrm>
+          <a:prstGeom prst="straightConnector1">
+            <a:avLst/>
+          </a:prstGeom>
+          <a:ln w="15875">
+            <a:solidFill>
+              <a:schemeClr val="tx2"/>
+            </a:solidFill>
+            <a:tailEnd type="arrow"/>
+          </a:ln>
+        </p:spPr>
+        <p:style>
+          <a:lnRef idx="1">
+            <a:schemeClr val="accent1"/>
+          </a:lnRef>
+          <a:fillRef idx="0">
+            <a:schemeClr val="accent1"/>
+          </a:fillRef>
+          <a:effectRef idx="0">
+            <a:schemeClr val="accent1"/>
+          </a:effectRef>
+          <a:fontRef idx="minor">
+            <a:schemeClr val="tx1"/>
+          </a:fontRef>
+        </p:style>
+      </p:cxnSp>
+    </p:spTree>
+    <p:extLst>
+      <p:ext uri="{BB962C8B-B14F-4D97-AF65-F5344CB8AC3E}">
+        <p14:creationId xmlns:p14="http://schemas.microsoft.com/office/powerpoint/2010/main" val="2664217487"/>
+      </p:ext>
+    </p:extLst>
+  </p:cSld>
+  <p:clrMapOvr>
+    <a:masterClrMapping/>
+  </p:clrMapOvr>
+  <p:transition>
+    <p:fade/>
+  </p:transition>
+  <p:timing>
+    <p:tnLst>
+      <p:par>
+        <p:cTn id="1" dur="indefinite" restart="never" nodeType="tmRoot"/>
+      </p:par>
+    </p:tnLst>
+  </p:timing>
 </p:sld>
 </file>
 

</xml_diff>

<commit_message>
+ created new Algorithms folder to contain the InputOutputSolves visio document and the new LaTeX document of the Input-Output Solve implemented in FAST v8. + Added CampbellDiagram.xls from Jason + updated InputOutputFiles.pptx to reflect new output file naming conventions
git-svn-id: https://windsvn2.nrel.gov/FAST/branches/BJonkman@661 10acb478-4768-415a-8850-bacdb5912d4d

Former-commit-id: de131905c40ecca68299c5674496db3839f04c11
</commit_message>
<xml_diff>
--- a/Docs/InputOutputFiles.pptx
+++ b/Docs/InputOutputFiles.pptx
@@ -124,7 +124,7 @@
             <p14:sldId id="258"/>
           </p14:sldIdLst>
         </p14:section>
-        <p14:section name="FAST v8.03.00 (aka v8.3)" id="{1B988F41-A5A3-4BA8-A660-A084A7538848}">
+        <p14:section name="FAST v8.05.00 (aka v8.5)" id="{1B988F41-A5A3-4BA8-A660-A084A7538848}">
           <p14:sldIdLst>
             <p14:sldId id="260"/>
             <p14:sldId id="261"/>
@@ -27226,66 +27226,31 @@
               <a:rPr lang="en-US" sz="1200" dirty="0" smtClean="0"/>
             </a:br>
             <a:r>
-              <a:rPr lang="en-US" sz="900" dirty="0">
+              <a:rPr lang="en-US" sz="800" dirty="0" smtClean="0">
                 <a:solidFill>
                   <a:srgbClr val="000000"/>
                 </a:solidFill>
                 <a:cs typeface="Arial" charset="0"/>
               </a:rPr>
-              <a:t>(</a:t>
-            </a:r>
-            <a:r>
-              <a:rPr lang="en-US" sz="700" dirty="0">
+              <a:t>(.</a:t>
+            </a:r>
+            <a:r>
+              <a:rPr lang="en-US" sz="800" dirty="0" err="1" smtClean="0">
                 <a:solidFill>
                   <a:srgbClr val="000000"/>
                 </a:solidFill>
                 <a:cs typeface="Arial" charset="0"/>
               </a:rPr>
-              <a:t>_</a:t>
-            </a:r>
-            <a:r>
-              <a:rPr lang="en-US" sz="700" dirty="0" err="1" smtClean="0">
+              <a:t>ED.sum</a:t>
+            </a:r>
+            <a:r>
+              <a:rPr lang="en-US" sz="800" dirty="0">
                 <a:solidFill>
                   <a:srgbClr val="000000"/>
                 </a:solidFill>
                 <a:cs typeface="Arial" charset="0"/>
               </a:rPr>
-              <a:t>ElastoDyn</a:t>
-            </a:r>
-            <a:r>
-              <a:rPr lang="en-US" sz="400" dirty="0" smtClean="0">
-                <a:solidFill>
-                  <a:srgbClr val="000000"/>
-                </a:solidFill>
-                <a:cs typeface="Arial" charset="0"/>
-              </a:rPr>
-              <a:t/>
-            </a:r>
-            <a:br>
-              <a:rPr lang="en-US" sz="400" dirty="0" smtClean="0">
-                <a:solidFill>
-                  <a:srgbClr val="000000"/>
-                </a:solidFill>
-                <a:cs typeface="Arial" charset="0"/>
-              </a:rPr>
-            </a:br>
-            <a:r>
-              <a:rPr lang="en-US" sz="900" dirty="0" smtClean="0">
-                <a:solidFill>
-                  <a:srgbClr val="000000"/>
-                </a:solidFill>
-                <a:cs typeface="Arial" charset="0"/>
-              </a:rPr>
-              <a:t>.</a:t>
-            </a:r>
-            <a:r>
-              <a:rPr lang="en-US" sz="900" dirty="0">
-                <a:solidFill>
-                  <a:srgbClr val="000000"/>
-                </a:solidFill>
-                <a:cs typeface="Arial" charset="0"/>
-              </a:rPr>
-              <a:t>sum)</a:t>
+              <a:t>)</a:t>
             </a:r>
           </a:p>
           <a:p>
@@ -27457,59 +27422,33 @@
               <a:rPr lang="en-US" sz="1200" dirty="0" smtClean="0"/>
             </a:br>
             <a:r>
-              <a:rPr lang="en-US" sz="900" dirty="0" smtClean="0">
+              <a:rPr lang="en-US" sz="800" dirty="0" smtClean="0">
                 <a:solidFill>
                   <a:srgbClr val="000000"/>
                 </a:solidFill>
                 <a:cs typeface="Arial" charset="0"/>
               </a:rPr>
-              <a:t>(</a:t>
-            </a:r>
-            <a:r>
-              <a:rPr lang="en-US" sz="700" dirty="0" smtClean="0">
+              <a:t>(.</a:t>
+            </a:r>
+            <a:r>
+              <a:rPr lang="en-US" sz="800" dirty="0" err="1" smtClean="0">
                 <a:solidFill>
                   <a:srgbClr val="000000"/>
                 </a:solidFill>
                 <a:cs typeface="Arial" charset="0"/>
               </a:rPr>
-              <a:t>_</a:t>
-            </a:r>
-            <a:r>
-              <a:rPr lang="en-US" sz="700" dirty="0" err="1" smtClean="0">
+              <a:t>ED.out</a:t>
+            </a:r>
+            <a:r>
+              <a:rPr lang="en-US" sz="800" dirty="0" smtClean="0">
                 <a:solidFill>
                   <a:srgbClr val="000000"/>
                 </a:solidFill>
                 <a:cs typeface="Arial" charset="0"/>
               </a:rPr>
-              <a:t>ElastoDyn</a:t>
-            </a:r>
-            <a:r>
-              <a:rPr lang="en-US" sz="400" dirty="0" smtClean="0">
-                <a:solidFill>
-                  <a:srgbClr val="000000"/>
-                </a:solidFill>
-                <a:cs typeface="Arial" charset="0"/>
-              </a:rPr>
-              <a:t/>
-            </a:r>
-            <a:br>
-              <a:rPr lang="en-US" sz="400" dirty="0" smtClean="0">
-                <a:solidFill>
-                  <a:srgbClr val="000000"/>
-                </a:solidFill>
-                <a:cs typeface="Arial" charset="0"/>
-              </a:rPr>
-            </a:br>
-            <a:r>
-              <a:rPr lang="en-US" sz="900" dirty="0" smtClean="0">
-                <a:solidFill>
-                  <a:srgbClr val="000000"/>
-                </a:solidFill>
-                <a:cs typeface="Arial" charset="0"/>
-              </a:rPr>
-              <a:t>.out)</a:t>
-            </a:r>
-            <a:endParaRPr lang="en-US" sz="900" dirty="0">
+              <a:t>)</a:t>
+            </a:r>
+            <a:endParaRPr lang="en-US" sz="800" dirty="0">
               <a:solidFill>
                 <a:srgbClr val="000000"/>
               </a:solidFill>
@@ -27753,67 +27692,42 @@
               <a:rPr lang="en-US" sz="1000" dirty="0" smtClean="0"/>
               <a:t>Series</a:t>
             </a:r>
-            <a:r>
-              <a:rPr lang="en-US" sz="1200" dirty="0" smtClean="0"/>
-              <a:t/>
-            </a:r>
-            <a:br>
-              <a:rPr lang="en-US" sz="1200" dirty="0" smtClean="0"/>
-            </a:br>
-            <a:r>
-              <a:rPr lang="en-US" sz="900" dirty="0" smtClean="0">
+            <a:endParaRPr lang="en-US" sz="1200" dirty="0" smtClean="0"/>
+          </a:p>
+          <a:p>
+            <a:pPr algn="ctr"/>
+            <a:r>
+              <a:rPr lang="en-US" sz="800" dirty="0" smtClean="0"/>
+              <a:t>(</a:t>
+            </a:r>
+            <a:r>
+              <a:rPr lang="en-US" sz="800" dirty="0" smtClean="0">
                 <a:solidFill>
                   <a:srgbClr val="000000"/>
                 </a:solidFill>
                 <a:cs typeface="Arial" charset="0"/>
               </a:rPr>
-              <a:t>(</a:t>
-            </a:r>
-            <a:r>
-              <a:rPr lang="en-US" sz="700" dirty="0" smtClean="0">
+              <a:t>.</a:t>
+            </a:r>
+            <a:r>
+              <a:rPr lang="en-US" sz="800" dirty="0" err="1" smtClean="0">
                 <a:solidFill>
                   <a:srgbClr val="000000"/>
                 </a:solidFill>
                 <a:cs typeface="Arial" charset="0"/>
               </a:rPr>
-              <a:t>_</a:t>
-            </a:r>
-            <a:r>
-              <a:rPr lang="en-US" sz="700" dirty="0" err="1" smtClean="0">
+              <a:t>SrvD.out</a:t>
+            </a:r>
+            <a:r>
+              <a:rPr lang="en-US" sz="800" dirty="0" smtClean="0">
                 <a:solidFill>
                   <a:srgbClr val="000000"/>
                 </a:solidFill>
                 <a:cs typeface="Arial" charset="0"/>
               </a:rPr>
-              <a:t>ServoDyn</a:t>
-            </a:r>
-            <a:r>
-              <a:rPr lang="en-US" sz="700" dirty="0" smtClean="0">
-                <a:solidFill>
-                  <a:srgbClr val="000000"/>
-                </a:solidFill>
-                <a:cs typeface="Arial" charset="0"/>
-              </a:rPr>
-              <a:t/>
-            </a:r>
-            <a:br>
-              <a:rPr lang="en-US" sz="700" dirty="0" smtClean="0">
-                <a:solidFill>
-                  <a:srgbClr val="000000"/>
-                </a:solidFill>
-                <a:cs typeface="Arial" charset="0"/>
-              </a:rPr>
-            </a:br>
-            <a:r>
-              <a:rPr lang="en-US" sz="900" dirty="0" smtClean="0">
-                <a:solidFill>
-                  <a:srgbClr val="000000"/>
-                </a:solidFill>
-                <a:cs typeface="Arial" charset="0"/>
-              </a:rPr>
-              <a:t>.out)</a:t>
-            </a:r>
-            <a:endParaRPr lang="en-US" sz="900" dirty="0">
+              <a:t>)</a:t>
+            </a:r>
+            <a:endParaRPr lang="en-US" sz="800" dirty="0">
               <a:solidFill>
                 <a:srgbClr val="000000"/>
               </a:solidFill>
@@ -28021,7 +27935,7 @@
               <a:rPr lang="en-US" sz="1200" dirty="0" smtClean="0"/>
             </a:br>
             <a:r>
-              <a:rPr lang="en-US" sz="900" dirty="0" smtClean="0">
+              <a:rPr lang="en-US" sz="800" dirty="0" smtClean="0">
                 <a:solidFill>
                   <a:srgbClr val="000000"/>
                 </a:solidFill>
@@ -28030,51 +27944,25 @@
               <a:t>(</a:t>
             </a:r>
             <a:r>
-              <a:rPr lang="en-US" sz="700" dirty="0" smtClean="0">
+              <a:rPr lang="en-US" sz="800" dirty="0">
                 <a:solidFill>
                   <a:srgbClr val="000000"/>
                 </a:solidFill>
                 <a:cs typeface="Arial" charset="0"/>
               </a:rPr>
-              <a:t>_</a:t>
-            </a:r>
-            <a:r>
-              <a:rPr lang="en-US" sz="700" dirty="0" err="1" smtClean="0">
+              <a:t>.</a:t>
+            </a:r>
+            <a:r>
+              <a:rPr lang="en-US" sz="800" dirty="0" err="1" smtClean="0">
                 <a:solidFill>
                   <a:srgbClr val="000000"/>
                 </a:solidFill>
                 <a:cs typeface="Arial" charset="0"/>
               </a:rPr>
-              <a:t>ServoDyn</a:t>
-            </a:r>
-            <a:r>
-              <a:rPr lang="en-US" sz="700" dirty="0" smtClean="0">
-                <a:solidFill>
-                  <a:srgbClr val="000000"/>
-                </a:solidFill>
-                <a:cs typeface="Arial" charset="0"/>
-              </a:rPr>
-              <a:t/>
-            </a:r>
-            <a:br>
-              <a:rPr lang="en-US" sz="700" dirty="0" smtClean="0">
-                <a:solidFill>
-                  <a:srgbClr val="000000"/>
-                </a:solidFill>
-                <a:cs typeface="Arial" charset="0"/>
-              </a:rPr>
-            </a:br>
-            <a:r>
-              <a:rPr lang="en-US" sz="900" dirty="0" smtClean="0">
-                <a:solidFill>
-                  <a:srgbClr val="000000"/>
-                </a:solidFill>
-                <a:cs typeface="Arial" charset="0"/>
-              </a:rPr>
-              <a:t>.sum</a:t>
-            </a:r>
-            <a:r>
-              <a:rPr lang="en-US" sz="900" dirty="0">
+              <a:t>SrvD.sum</a:t>
+            </a:r>
+            <a:r>
+              <a:rPr lang="en-US" sz="800" dirty="0">
                 <a:solidFill>
                   <a:srgbClr val="000000"/>
                 </a:solidFill>
@@ -28356,15 +28244,33 @@
               <a:rPr lang="en-US" sz="1200" dirty="0" smtClean="0"/>
             </a:br>
             <a:r>
-              <a:rPr lang="en-US" sz="900" dirty="0" smtClean="0">
+              <a:rPr lang="en-US" sz="800" dirty="0" smtClean="0">
                 <a:solidFill>
                   <a:srgbClr val="000000"/>
                 </a:solidFill>
                 <a:cs typeface="Arial" charset="0"/>
               </a:rPr>
-              <a:t>(.opt)</a:t>
-            </a:r>
-            <a:endParaRPr lang="en-US" sz="900" dirty="0">
+              <a:t>(.</a:t>
+            </a:r>
+            <a:r>
+              <a:rPr lang="en-US" sz="800" dirty="0" err="1" smtClean="0">
+                <a:solidFill>
+                  <a:srgbClr val="000000"/>
+                </a:solidFill>
+                <a:cs typeface="Arial" charset="0"/>
+              </a:rPr>
+              <a:t>AD.sum</a:t>
+            </a:r>
+            <a:r>
+              <a:rPr lang="en-US" sz="800" dirty="0" smtClean="0">
+                <a:solidFill>
+                  <a:srgbClr val="000000"/>
+                </a:solidFill>
+                <a:cs typeface="Arial" charset="0"/>
+              </a:rPr>
+              <a:t>)</a:t>
+            </a:r>
+            <a:endParaRPr lang="en-US" sz="800" dirty="0">
               <a:solidFill>
                 <a:srgbClr val="000000"/>
               </a:solidFill>
@@ -28559,26 +28465,58 @@
           <a:p>
             <a:pPr algn="ctr"/>
             <a:r>
-              <a:rPr lang="en-US" sz="1100" dirty="0" smtClean="0"/>
+              <a:rPr lang="en-US" sz="950" dirty="0" smtClean="0"/>
               <a:t>Element</a:t>
             </a:r>
-            <a:r>
-              <a:rPr lang="en-US" sz="1200" dirty="0" smtClean="0"/>
+          </a:p>
+          <a:p>
+            <a:pPr algn="ctr"/>
+            <a:r>
+              <a:rPr lang="en-US" sz="950" dirty="0" smtClean="0"/>
+              <a:t>Time</a:t>
+            </a:r>
+          </a:p>
+          <a:p>
+            <a:pPr algn="ctr"/>
+            <a:r>
+              <a:rPr lang="en-US" sz="950" dirty="0" smtClean="0"/>
+              <a:t>Series</a:t>
+            </a:r>
+            <a:r>
+              <a:rPr lang="en-US" sz="1050" dirty="0" smtClean="0"/>
               <a:t/>
             </a:r>
             <a:br>
-              <a:rPr lang="en-US" sz="1200" dirty="0" smtClean="0"/>
+              <a:rPr lang="en-US" sz="1050" dirty="0" smtClean="0"/>
             </a:br>
             <a:r>
-              <a:rPr lang="en-US" sz="900" dirty="0" smtClean="0">
+              <a:rPr lang="en-US" sz="800" dirty="0" smtClean="0">
                 <a:solidFill>
                   <a:srgbClr val="000000"/>
                 </a:solidFill>
                 <a:cs typeface="Arial" charset="0"/>
               </a:rPr>
-              <a:t>(.elm)</a:t>
-            </a:r>
-            <a:endParaRPr lang="en-US" sz="900" dirty="0">
+              <a:t>(.</a:t>
+            </a:r>
+            <a:r>
+              <a:rPr lang="en-US" sz="800" dirty="0" err="1" smtClean="0">
+                <a:solidFill>
+                  <a:srgbClr val="000000"/>
+                </a:solidFill>
+                <a:cs typeface="Arial" charset="0"/>
+              </a:rPr>
+              <a:t>AD.out</a:t>
+            </a:r>
+            <a:r>
+              <a:rPr lang="en-US" sz="800" dirty="0" smtClean="0">
+                <a:solidFill>
+                  <a:srgbClr val="000000"/>
+                </a:solidFill>
+                <a:cs typeface="Arial" charset="0"/>
+              </a:rPr>
+              <a:t>)</a:t>
+            </a:r>
+            <a:endParaRPr lang="en-US" sz="800" dirty="0">
               <a:solidFill>
                 <a:srgbClr val="000000"/>
               </a:solidFill>
@@ -29589,66 +29527,31 @@
               <a:rPr lang="en-US" sz="1200" dirty="0" smtClean="0"/>
             </a:br>
             <a:r>
-              <a:rPr lang="en-US" sz="900" dirty="0" smtClean="0">
+              <a:rPr lang="en-US" sz="800" dirty="0" smtClean="0">
                 <a:solidFill>
                   <a:srgbClr val="000000"/>
                 </a:solidFill>
                 <a:cs typeface="Arial" charset="0"/>
               </a:rPr>
-              <a:t>(</a:t>
-            </a:r>
-            <a:r>
-              <a:rPr lang="en-US" sz="700" dirty="0" smtClean="0">
+              <a:t>(.</a:t>
+            </a:r>
+            <a:r>
+              <a:rPr lang="en-US" sz="800" dirty="0" err="1" smtClean="0">
                 <a:solidFill>
                   <a:srgbClr val="000000"/>
                 </a:solidFill>
                 <a:cs typeface="Arial" charset="0"/>
               </a:rPr>
-              <a:t>_</a:t>
-            </a:r>
-            <a:r>
-              <a:rPr lang="en-US" sz="700" dirty="0" err="1" smtClean="0">
+              <a:t>HD.sum</a:t>
+            </a:r>
+            <a:r>
+              <a:rPr lang="en-US" sz="800" dirty="0">
                 <a:solidFill>
                   <a:srgbClr val="000000"/>
                 </a:solidFill>
                 <a:cs typeface="Arial" charset="0"/>
               </a:rPr>
-              <a:t>HydroDyn</a:t>
-            </a:r>
-            <a:r>
-              <a:rPr lang="en-US" sz="400" dirty="0" smtClean="0">
-                <a:solidFill>
-                  <a:srgbClr val="000000"/>
-                </a:solidFill>
-                <a:cs typeface="Arial" charset="0"/>
-              </a:rPr>
-              <a:t/>
-            </a:r>
-            <a:br>
-              <a:rPr lang="en-US" sz="400" dirty="0" smtClean="0">
-                <a:solidFill>
-                  <a:srgbClr val="000000"/>
-                </a:solidFill>
-                <a:cs typeface="Arial" charset="0"/>
-              </a:rPr>
-            </a:br>
-            <a:r>
-              <a:rPr lang="en-US" sz="900" dirty="0" smtClean="0">
-                <a:solidFill>
-                  <a:srgbClr val="000000"/>
-                </a:solidFill>
-                <a:cs typeface="Arial" charset="0"/>
-              </a:rPr>
-              <a:t>.</a:t>
-            </a:r>
-            <a:r>
-              <a:rPr lang="en-US" sz="900" dirty="0">
-                <a:solidFill>
-                  <a:srgbClr val="000000"/>
-                </a:solidFill>
-                <a:cs typeface="Arial" charset="0"/>
-              </a:rPr>
-              <a:t>sum)</a:t>
+              <a:t>)</a:t>
             </a:r>
           </a:p>
           <a:p>
@@ -29820,59 +29723,33 @@
               <a:rPr lang="en-US" sz="1200" dirty="0" smtClean="0"/>
             </a:br>
             <a:r>
-              <a:rPr lang="en-US" sz="900" dirty="0" smtClean="0">
+              <a:rPr lang="en-US" sz="800" dirty="0" smtClean="0">
                 <a:solidFill>
                   <a:srgbClr val="000000"/>
                 </a:solidFill>
                 <a:cs typeface="Arial" charset="0"/>
               </a:rPr>
-              <a:t>(</a:t>
-            </a:r>
-            <a:r>
-              <a:rPr lang="en-US" sz="700" dirty="0">
+              <a:t>(.</a:t>
+            </a:r>
+            <a:r>
+              <a:rPr lang="en-US" sz="800" dirty="0" err="1" smtClean="0">
                 <a:solidFill>
                   <a:srgbClr val="000000"/>
                 </a:solidFill>
                 <a:cs typeface="Arial" charset="0"/>
               </a:rPr>
-              <a:t>_ </a:t>
-            </a:r>
-            <a:r>
-              <a:rPr lang="en-US" sz="700" dirty="0" err="1">
+              <a:t>HD.out</a:t>
+            </a:r>
+            <a:r>
+              <a:rPr lang="en-US" sz="800" dirty="0" smtClean="0">
                 <a:solidFill>
                   <a:srgbClr val="000000"/>
                 </a:solidFill>
                 <a:cs typeface="Arial" charset="0"/>
               </a:rPr>
-              <a:t>HydroDyn</a:t>
-            </a:r>
-            <a:r>
-              <a:rPr lang="en-US" sz="400" dirty="0" smtClean="0">
-                <a:solidFill>
-                  <a:srgbClr val="000000"/>
-                </a:solidFill>
-                <a:cs typeface="Arial" charset="0"/>
-              </a:rPr>
-              <a:t/>
-            </a:r>
-            <a:br>
-              <a:rPr lang="en-US" sz="400" dirty="0" smtClean="0">
-                <a:solidFill>
-                  <a:srgbClr val="000000"/>
-                </a:solidFill>
-                <a:cs typeface="Arial" charset="0"/>
-              </a:rPr>
-            </a:br>
-            <a:r>
-              <a:rPr lang="en-US" sz="900" dirty="0" smtClean="0">
-                <a:solidFill>
-                  <a:srgbClr val="000000"/>
-                </a:solidFill>
-                <a:cs typeface="Arial" charset="0"/>
-              </a:rPr>
-              <a:t>.out)</a:t>
-            </a:r>
-            <a:endParaRPr lang="en-US" sz="900" dirty="0">
+              <a:t>)</a:t>
+            </a:r>
+            <a:endParaRPr lang="en-US" sz="800" dirty="0">
               <a:solidFill>
                 <a:srgbClr val="000000"/>
               </a:solidFill>
@@ -30443,17 +30320,18 @@
               <a:rPr lang="en-US" sz="950" dirty="0" smtClean="0"/>
             </a:br>
             <a:r>
-              <a:rPr lang="en-US" sz="950" dirty="0" smtClean="0"/>
-              <a:t>(summary</a:t>
-            </a:r>
-            <a:br>
-              <a:rPr lang="en-US" sz="950" dirty="0" smtClean="0"/>
-            </a:br>
-            <a:r>
-              <a:rPr lang="en-US" sz="950" dirty="0" smtClean="0"/>
-              <a:t>.map)</a:t>
-            </a:r>
-            <a:endParaRPr lang="en-US" sz="950" dirty="0"/>
+              <a:rPr lang="en-US" sz="800" dirty="0" smtClean="0"/>
+              <a:t>(.</a:t>
+            </a:r>
+            <a:r>
+              <a:rPr lang="en-US" sz="800" dirty="0" err="1" smtClean="0"/>
+              <a:t>MAP.sum</a:t>
+            </a:r>
+            <a:r>
+              <a:rPr lang="en-US" sz="800" dirty="0" smtClean="0"/>
+              <a:t>)</a:t>
+            </a:r>
+            <a:endParaRPr lang="en-US" sz="800" dirty="0"/>
           </a:p>
         </p:txBody>
       </p:sp>
@@ -30650,57 +30528,31 @@
               <a:rPr lang="en-US" sz="1200" dirty="0" smtClean="0"/>
             </a:br>
             <a:r>
-              <a:rPr lang="en-US" sz="900" dirty="0" smtClean="0">
+              <a:rPr lang="en-US" sz="800" dirty="0" smtClean="0">
                 <a:solidFill>
                   <a:srgbClr val="000000"/>
                 </a:solidFill>
                 <a:cs typeface="Arial" charset="0"/>
               </a:rPr>
-              <a:t>( </a:t>
-            </a:r>
-            <a:r>
-              <a:rPr lang="en-US" sz="700" dirty="0" smtClean="0">
+              <a:t>(.</a:t>
+            </a:r>
+            <a:r>
+              <a:rPr lang="en-US" sz="800" dirty="0" err="1" smtClean="0">
                 <a:solidFill>
                   <a:srgbClr val="000000"/>
                 </a:solidFill>
                 <a:cs typeface="Arial" charset="0"/>
               </a:rPr>
-              <a:t>_SD</a:t>
-            </a:r>
-            <a:r>
-              <a:rPr lang="en-US" sz="400" dirty="0" smtClean="0">
+              <a:t>SD.sum</a:t>
+            </a:r>
+            <a:r>
+              <a:rPr lang="en-US" sz="800" dirty="0">
                 <a:solidFill>
                   <a:srgbClr val="000000"/>
                 </a:solidFill>
                 <a:cs typeface="Arial" charset="0"/>
               </a:rPr>
-              <a:t/>
-            </a:r>
-            <a:br>
-              <a:rPr lang="en-US" sz="400" dirty="0" smtClean="0">
-                <a:solidFill>
-                  <a:srgbClr val="000000"/>
-                </a:solidFill>
-                <a:cs typeface="Arial" charset="0"/>
-              </a:rPr>
-            </a:br>
-            <a:r>
-              <a:rPr lang="en-US" sz="900" dirty="0" smtClean="0">
-                <a:solidFill>
-                  <a:srgbClr val="000000"/>
-                </a:solidFill>
-                <a:cs typeface="Arial" charset="0"/>
-              </a:rPr>
-              <a:t>.</a:t>
-            </a:r>
-            <a:r>
-              <a:rPr lang="en-US" sz="900" dirty="0">
-                <a:solidFill>
-                  <a:srgbClr val="000000"/>
-                </a:solidFill>
-                <a:cs typeface="Arial" charset="0"/>
-              </a:rPr>
-              <a:t>sum)</a:t>
+              <a:t>)</a:t>
             </a:r>
           </a:p>
           <a:p>
@@ -30872,50 +30724,33 @@
               <a:rPr lang="en-US" sz="1200" dirty="0" smtClean="0"/>
             </a:br>
             <a:r>
-              <a:rPr lang="en-US" sz="900" dirty="0" smtClean="0">
+              <a:rPr lang="en-US" sz="800" dirty="0" smtClean="0">
                 <a:solidFill>
                   <a:srgbClr val="000000"/>
                 </a:solidFill>
                 <a:cs typeface="Arial" charset="0"/>
               </a:rPr>
-              <a:t>( </a:t>
-            </a:r>
-            <a:r>
-              <a:rPr lang="en-US" sz="700" dirty="0" smtClean="0">
+              <a:t>(.</a:t>
+            </a:r>
+            <a:r>
+              <a:rPr lang="en-US" sz="800" dirty="0" err="1" smtClean="0">
                 <a:solidFill>
                   <a:srgbClr val="000000"/>
                 </a:solidFill>
                 <a:cs typeface="Arial" charset="0"/>
               </a:rPr>
-              <a:t>_SD</a:t>
-            </a:r>
-            <a:r>
-              <a:rPr lang="en-US" sz="400" dirty="0" smtClean="0">
+              <a:t>SD.out</a:t>
+            </a:r>
+            <a:r>
+              <a:rPr lang="en-US" sz="800" dirty="0" smtClean="0">
                 <a:solidFill>
                   <a:srgbClr val="000000"/>
                 </a:solidFill>
                 <a:cs typeface="Arial" charset="0"/>
               </a:rPr>
-              <a:t/>
-            </a:r>
-            <a:br>
-              <a:rPr lang="en-US" sz="400" dirty="0" smtClean="0">
-                <a:solidFill>
-                  <a:srgbClr val="000000"/>
-                </a:solidFill>
-                <a:cs typeface="Arial" charset="0"/>
-              </a:rPr>
-            </a:br>
-            <a:r>
-              <a:rPr lang="en-US" sz="900" dirty="0" smtClean="0">
-                <a:solidFill>
-                  <a:srgbClr val="000000"/>
-                </a:solidFill>
-                <a:cs typeface="Arial" charset="0"/>
-              </a:rPr>
-              <a:t>.out)</a:t>
-            </a:r>
-            <a:endParaRPr lang="en-US" sz="900" dirty="0">
+              <a:t>)</a:t>
+            </a:r>
+            <a:endParaRPr lang="en-US" sz="800" dirty="0">
               <a:solidFill>
                 <a:srgbClr val="000000"/>
               </a:solidFill>
@@ -31163,18 +30998,18 @@
               <a:rPr lang="en-US" sz="950" dirty="0" smtClean="0"/>
             </a:br>
             <a:r>
-              <a:rPr lang="en-US" sz="950" dirty="0" smtClean="0"/>
-              <a:t>(</a:t>
-            </a:r>
-            <a:r>
-              <a:rPr lang="en-US" sz="950" dirty="0" err="1" smtClean="0"/>
-              <a:t>map.out</a:t>
-            </a:r>
-            <a:r>
-              <a:rPr lang="en-US" sz="950" dirty="0" smtClean="0"/>
+              <a:rPr lang="en-US" sz="800" dirty="0" smtClean="0"/>
+              <a:t>(.</a:t>
+            </a:r>
+            <a:r>
+              <a:rPr lang="en-US" sz="800" dirty="0" err="1" smtClean="0"/>
+              <a:t>MAP.out</a:t>
+            </a:r>
+            <a:r>
+              <a:rPr lang="en-US" sz="800" dirty="0" smtClean="0"/>
               <a:t>)</a:t>
             </a:r>
-            <a:endParaRPr lang="en-US" sz="950" dirty="0"/>
+            <a:endParaRPr lang="en-US" sz="800" dirty="0"/>
           </a:p>
         </p:txBody>
       </p:sp>
@@ -31276,7 +31111,7 @@
       </p:sp>
       <p:pic>
         <p:nvPicPr>
-          <p:cNvPr id="2051" name="Picture 3"/>
+          <p:cNvPr id="1027" name="Picture 3"/>
           <p:cNvPicPr>
             <a:picLocks noChangeAspect="1" noChangeArrowheads="1"/>
           </p:cNvPicPr>
@@ -31297,8 +31132,8 @@
         </p:blipFill>
         <p:spPr bwMode="auto">
           <a:xfrm>
-            <a:off x="63500" y="195263"/>
-            <a:ext cx="9017000" cy="6357937"/>
+            <a:off x="93663" y="304800"/>
+            <a:ext cx="8955087" cy="6357937"/>
           </a:xfrm>
           <a:prstGeom prst="rect">
             <a:avLst/>
@@ -31386,7 +31221,7 @@
           <a:bodyPr/>
           <a:lstStyle/>
           <a:p>
-            <a:endParaRPr lang="en-US"/>
+            <a:endParaRPr lang="en-US" dirty="0"/>
           </a:p>
         </p:txBody>
       </p:sp>
@@ -31405,7 +31240,7 @@
           <a:bodyPr/>
           <a:lstStyle/>
           <a:p>
-            <a:endParaRPr lang="en-US"/>
+            <a:endParaRPr lang="en-US" dirty="0"/>
           </a:p>
         </p:txBody>
       </p:sp>

</xml_diff>